<commit_message>
Finalize "Sentiment Analysis in .NET" slides.
</commit_message>
<xml_diff>
--- a/ABP/Dotnet-Conf-2024/Sentiment-Analysis-in-NET.pptx
+++ b/ABP/Dotnet-Conf-2024/Sentiment-Analysis-in-NET.pptx
@@ -16,27 +16,28 @@
     <p:sldId id="261" r:id="rId12"/>
     <p:sldId id="262" r:id="rId13"/>
     <p:sldId id="263" r:id="rId14"/>
+    <p:sldId id="264" r:id="rId15"/>
   </p:sldIdLst>
   <p:sldSz cy="10287000" cx="18288000"/>
   <p:notesSz cx="6858000" cy="9144000"/>
   <p:embeddedFontLst>
     <p:embeddedFont>
       <p:font typeface="Roboto"/>
-      <p:regular r:id="rId15"/>
-      <p:bold r:id="rId16"/>
-      <p:italic r:id="rId17"/>
-      <p:boldItalic r:id="rId18"/>
+      <p:regular r:id="rId16"/>
+      <p:bold r:id="rId17"/>
+      <p:italic r:id="rId18"/>
+      <p:boldItalic r:id="rId19"/>
     </p:embeddedFont>
     <p:embeddedFont>
       <p:font typeface="Montserrat"/>
-      <p:regular r:id="rId19"/>
-      <p:bold r:id="rId20"/>
-      <p:italic r:id="rId21"/>
-      <p:boldItalic r:id="rId22"/>
+      <p:regular r:id="rId20"/>
+      <p:bold r:id="rId21"/>
+      <p:italic r:id="rId22"/>
+      <p:boldItalic r:id="rId23"/>
     </p:embeddedFont>
     <p:embeddedFont>
       <p:font typeface="Archivo Black"/>
-      <p:regular r:id="rId23"/>
+      <p:regular r:id="rId24"/>
     </p:embeddedFont>
   </p:embeddedFontLst>
   <p:defaultTextStyle>
@@ -1350,7 +1351,7 @@
       </p:grpSpPr>
       <p:sp>
         <p:nvSpPr>
-          <p:cNvPr id="126" name="Google Shape;126;g2d159c2ab0f_0_31:notes"/>
+          <p:cNvPr id="126" name="Google Shape;126;p11:notes"/>
           <p:cNvSpPr txBox="1"/>
           <p:nvPr>
             <p:ph idx="1" type="body"/>
@@ -1372,9 +1373,6 @@
           <a:lstStyle/>
           <a:p>
             <a:pPr indent="0" lvl="0" marL="0" rtl="0" algn="l">
-              <a:lnSpc>
-                <a:spcPct val="150000"/>
-              </a:lnSpc>
               <a:spcBef>
                 <a:spcPts val="0"/>
               </a:spcBef>
@@ -1389,22 +1387,14 @@
               <a:buNone/>
             </a:pPr>
             <a:r>
-              <a:rPr b="1" lang="en-US" sz="1200">
+              <a:rPr lang="en-US">
                 <a:solidFill>
                   <a:schemeClr val="dk1"/>
                 </a:solidFill>
               </a:rPr>
-              <a:t>Note: </a:t>
+              <a:t>In a typical machine-learning process, we mainly have four or five steps:</a:t>
             </a:r>
-            <a:r>
-              <a:rPr lang="en-US" sz="1200">
-                <a:solidFill>
-                  <a:schemeClr val="dk1"/>
-                </a:solidFill>
-              </a:rPr>
-              <a:t>Before using the model, it should be tested against the splitted test data. Accuracy and other metrics should be evaluated and if it does not meet the criterias then a new algorithm should be selected and the dataset should be populated.</a:t>
-            </a:r>
-            <a:endParaRPr sz="1200">
+            <a:endParaRPr>
               <a:solidFill>
                 <a:schemeClr val="dk1"/>
               </a:solidFill>
@@ -1418,18 +1408,732 @@
               <a:spcAft>
                 <a:spcPts val="0"/>
               </a:spcAft>
+              <a:buClr>
+                <a:schemeClr val="dk1"/>
+              </a:buClr>
+              <a:buSzPts val="1100"/>
+              <a:buFont typeface="Arial"/>
               <a:buNone/>
             </a:pPr>
             <a:r>
               <a:t/>
             </a:r>
-            <a:endParaRPr sz="200"/>
+            <a:endParaRPr>
+              <a:solidFill>
+                <a:schemeClr val="dk1"/>
+              </a:solidFill>
+            </a:endParaRPr>
+          </a:p>
+          <a:p>
+            <a:pPr indent="-298450" lvl="0" marL="457200" rtl="0" algn="l">
+              <a:spcBef>
+                <a:spcPts val="0"/>
+              </a:spcBef>
+              <a:spcAft>
+                <a:spcPts val="0"/>
+              </a:spcAft>
+              <a:buClr>
+                <a:schemeClr val="dk1"/>
+              </a:buClr>
+              <a:buSzPts val="1100"/>
+              <a:buAutoNum type="arabicPeriod"/>
+            </a:pPr>
+            <a:r>
+              <a:rPr lang="en-US">
+                <a:solidFill>
+                  <a:schemeClr val="dk1"/>
+                </a:solidFill>
+              </a:rPr>
+              <a:t>First, we need to have a data-set and </a:t>
+            </a:r>
+            <a:r>
+              <a:rPr b="1" lang="en-US">
+                <a:solidFill>
+                  <a:schemeClr val="dk1"/>
+                </a:solidFill>
+              </a:rPr>
+              <a:t>build a model</a:t>
+            </a:r>
+            <a:r>
+              <a:rPr lang="en-US">
+                <a:solidFill>
+                  <a:schemeClr val="dk1"/>
+                </a:solidFill>
+              </a:rPr>
+              <a:t> according to that.</a:t>
+            </a:r>
+            <a:endParaRPr>
+              <a:solidFill>
+                <a:schemeClr val="dk1"/>
+              </a:solidFill>
+            </a:endParaRPr>
+          </a:p>
+          <a:p>
+            <a:pPr indent="-298450" lvl="0" marL="457200" rtl="0" algn="l">
+              <a:spcBef>
+                <a:spcPts val="0"/>
+              </a:spcBef>
+              <a:spcAft>
+                <a:spcPts val="0"/>
+              </a:spcAft>
+              <a:buClr>
+                <a:schemeClr val="dk1"/>
+              </a:buClr>
+              <a:buSzPts val="1100"/>
+              <a:buAutoNum type="arabicPeriod"/>
+            </a:pPr>
+            <a:r>
+              <a:rPr lang="en-US">
+                <a:solidFill>
+                  <a:schemeClr val="dk1"/>
+                </a:solidFill>
+              </a:rPr>
+              <a:t>Then, we should </a:t>
+            </a:r>
+            <a:r>
+              <a:rPr b="1" lang="en-US">
+                <a:solidFill>
+                  <a:schemeClr val="dk1"/>
+                </a:solidFill>
+              </a:rPr>
+              <a:t>train the model</a:t>
+            </a:r>
+            <a:r>
+              <a:rPr lang="en-US">
+                <a:solidFill>
+                  <a:schemeClr val="dk1"/>
+                </a:solidFill>
+              </a:rPr>
+              <a:t> (for this we should choose an algorithm to tune the parameters of the model).</a:t>
+            </a:r>
+            <a:endParaRPr>
+              <a:solidFill>
+                <a:schemeClr val="dk1"/>
+              </a:solidFill>
+            </a:endParaRPr>
+          </a:p>
+          <a:p>
+            <a:pPr indent="-298450" lvl="0" marL="457200" rtl="0" algn="l">
+              <a:spcBef>
+                <a:spcPts val="0"/>
+              </a:spcBef>
+              <a:spcAft>
+                <a:spcPts val="0"/>
+              </a:spcAft>
+              <a:buClr>
+                <a:schemeClr val="dk1"/>
+              </a:buClr>
+              <a:buSzPts val="1100"/>
+              <a:buAutoNum type="arabicPeriod"/>
+            </a:pPr>
+            <a:r>
+              <a:rPr lang="en-US">
+                <a:solidFill>
+                  <a:schemeClr val="dk1"/>
+                </a:solidFill>
+              </a:rPr>
+              <a:t>After that, for the third step, we need to </a:t>
+            </a:r>
+            <a:r>
+              <a:rPr b="1" lang="en-US">
+                <a:solidFill>
+                  <a:schemeClr val="dk1"/>
+                </a:solidFill>
+              </a:rPr>
+              <a:t>evaluate the model</a:t>
+            </a:r>
+            <a:r>
+              <a:rPr lang="en-US">
+                <a:solidFill>
+                  <a:schemeClr val="dk1"/>
+                </a:solidFill>
+              </a:rPr>
+              <a:t> to see the accuracy of our model on new data. If we are not satisfied with the quality of the model, then we should try to improve it by providing larger training datasets and by choosing different training algorithms with different parameters.</a:t>
+            </a:r>
+            <a:endParaRPr>
+              <a:solidFill>
+                <a:schemeClr val="dk1"/>
+              </a:solidFill>
+            </a:endParaRPr>
+          </a:p>
+          <a:p>
+            <a:pPr indent="-298450" lvl="0" marL="457200" rtl="0" algn="l">
+              <a:spcBef>
+                <a:spcPts val="0"/>
+              </a:spcBef>
+              <a:spcAft>
+                <a:spcPts val="0"/>
+              </a:spcAft>
+              <a:buClr>
+                <a:schemeClr val="dk1"/>
+              </a:buClr>
+              <a:buSzPts val="1100"/>
+              <a:buAutoNum type="arabicPeriod"/>
+            </a:pPr>
+            <a:r>
+              <a:rPr lang="en-US">
+                <a:solidFill>
+                  <a:schemeClr val="dk1"/>
+                </a:solidFill>
+              </a:rPr>
+              <a:t>After evaluating the model and be okay with its accuracy, finally we can </a:t>
+            </a:r>
+            <a:r>
+              <a:rPr b="1" lang="en-US">
+                <a:solidFill>
+                  <a:schemeClr val="dk1"/>
+                </a:solidFill>
+              </a:rPr>
+              <a:t>consume the model</a:t>
+            </a:r>
+            <a:r>
+              <a:rPr lang="en-US">
+                <a:solidFill>
+                  <a:schemeClr val="dk1"/>
+                </a:solidFill>
+              </a:rPr>
+              <a:t>.</a:t>
+            </a:r>
+            <a:endParaRPr>
+              <a:solidFill>
+                <a:schemeClr val="dk1"/>
+              </a:solidFill>
+            </a:endParaRPr>
+          </a:p>
+          <a:p>
+            <a:pPr indent="0" lvl="0" marL="0" rtl="0" algn="l">
+              <a:spcBef>
+                <a:spcPts val="0"/>
+              </a:spcBef>
+              <a:spcAft>
+                <a:spcPts val="0"/>
+              </a:spcAft>
+              <a:buNone/>
+            </a:pPr>
+            <a:r>
+              <a:t/>
+            </a:r>
+            <a:endParaRPr/>
+          </a:p>
+          <a:p>
+            <a:pPr indent="0" lvl="0" marL="0" rtl="0" algn="l">
+              <a:spcBef>
+                <a:spcPts val="0"/>
+              </a:spcBef>
+              <a:spcAft>
+                <a:spcPts val="0"/>
+              </a:spcAft>
+              <a:buNone/>
+            </a:pPr>
+            <a:r>
+              <a:t/>
+            </a:r>
+            <a:endParaRPr/>
+          </a:p>
+          <a:p>
+            <a:pPr indent="0" lvl="0" marL="0" rtl="0" algn="l">
+              <a:spcBef>
+                <a:spcPts val="0"/>
+              </a:spcBef>
+              <a:spcAft>
+                <a:spcPts val="0"/>
+              </a:spcAft>
+              <a:buNone/>
+            </a:pPr>
+            <a:r>
+              <a:rPr lang="en-US"/>
+              <a:t>If you look at these flow, for our example, we have the same step by step flow, and I will show you that on the code.</a:t>
+            </a:r>
+            <a:endParaRPr/>
+          </a:p>
+          <a:p>
+            <a:pPr indent="0" lvl="0" marL="0" rtl="0" algn="l">
+              <a:spcBef>
+                <a:spcPts val="0"/>
+              </a:spcBef>
+              <a:spcAft>
+                <a:spcPts val="0"/>
+              </a:spcAft>
+              <a:buNone/>
+            </a:pPr>
+            <a:r>
+              <a:t/>
+            </a:r>
+            <a:endParaRPr/>
+          </a:p>
+          <a:p>
+            <a:pPr indent="0" lvl="0" marL="0" rtl="0" algn="l">
+              <a:spcBef>
+                <a:spcPts val="0"/>
+              </a:spcBef>
+              <a:spcAft>
+                <a:spcPts val="0"/>
+              </a:spcAft>
+              <a:buNone/>
+            </a:pPr>
+            <a:r>
+              <a:rPr lang="en-US"/>
+              <a:t>We will first add a comment, then a machine-learning model will be build and make a sentiment analysis, the model will evaluate the results and will predict a result for us (either positive or negative) and then the system will approve or reject our comment in the background.</a:t>
+            </a:r>
+            <a:endParaRPr/>
+          </a:p>
+          <a:p>
+            <a:pPr indent="0" lvl="0" marL="0" rtl="0" algn="l">
+              <a:spcBef>
+                <a:spcPts val="0"/>
+              </a:spcBef>
+              <a:spcAft>
+                <a:spcPts val="0"/>
+              </a:spcAft>
+              <a:buNone/>
+            </a:pPr>
+            <a:r>
+              <a:t/>
+            </a:r>
+            <a:endParaRPr/>
+          </a:p>
+          <a:p>
+            <a:pPr indent="0" lvl="0" marL="0" rtl="0" algn="l">
+              <a:spcBef>
+                <a:spcPts val="0"/>
+              </a:spcBef>
+              <a:spcAft>
+                <a:spcPts val="0"/>
+              </a:spcAft>
+              <a:buNone/>
+            </a:pPr>
+            <a:r>
+              <a:rPr lang="en-US"/>
+              <a:t>Now, Let’s see the demo in action and then deep dive into the code.</a:t>
+            </a:r>
+            <a:endParaRPr/>
           </a:p>
         </p:txBody>
       </p:sp>
       <p:sp>
         <p:nvSpPr>
-          <p:cNvPr id="127" name="Google Shape;127;g2d159c2ab0f_0_31:notes"/>
+          <p:cNvPr id="127" name="Google Shape;127;p11:notes"/>
+          <p:cNvSpPr/>
+          <p:nvPr>
+            <p:ph idx="2" type="sldImg"/>
+          </p:nvPr>
+        </p:nvSpPr>
+        <p:spPr>
+          <a:xfrm>
+            <a:off x="1143225" y="685800"/>
+            <a:ext cx="4572225" cy="3429000"/>
+          </a:xfrm>
+          <a:custGeom>
+            <a:rect b="b" l="l" r="r" t="t"/>
+            <a:pathLst>
+              <a:path extrusionOk="0" h="120000" w="120000">
+                <a:moveTo>
+                  <a:pt x="0" y="0"/>
+                </a:moveTo>
+                <a:lnTo>
+                  <a:pt x="120000" y="0"/>
+                </a:lnTo>
+                <a:lnTo>
+                  <a:pt x="120000" y="120000"/>
+                </a:lnTo>
+                <a:lnTo>
+                  <a:pt x="0" y="120000"/>
+                </a:lnTo>
+                <a:close/>
+              </a:path>
+            </a:pathLst>
+          </a:custGeom>
+        </p:spPr>
+      </p:sp>
+    </p:spTree>
+  </p:cSld>
+  <p:clrMapOvr>
+    <a:masterClrMapping/>
+  </p:clrMapOvr>
+</p:notes>
+</file>
+
+<file path=ppt/notesSlides/notesSlide7.xml><?xml version="1.0" encoding="utf-8"?>
+<p:notes xmlns:a="http://schemas.openxmlformats.org/drawingml/2006/main" xmlns:r="http://schemas.openxmlformats.org/officeDocument/2006/relationships" xmlns:mc="http://schemas.openxmlformats.org/markup-compatibility/2006" xmlns:mv="urn:schemas-microsoft-com:mac:vml" xmlns:p="http://schemas.openxmlformats.org/presentationml/2006/main" xmlns:c="http://schemas.openxmlformats.org/drawingml/2006/chart" xmlns:dgm="http://schemas.openxmlformats.org/drawingml/2006/diagram" xmlns:o="urn:schemas-microsoft-com:office:office" xmlns:v="urn:schemas-microsoft-com:vml" xmlns:pvml="urn:schemas-microsoft-com:office:powerpoint" xmlns:com="http://schemas.openxmlformats.org/drawingml/2006/compatibility" xmlns:p14="http://schemas.microsoft.com/office/powerpoint/2010/main" xmlns:p15="http://schemas.microsoft.com/office/powerpoint/2012/main" xmlns:ahyp="http://schemas.microsoft.com/office/drawing/2018/hyperlinkcolor" showMasterPhAnim="0" showMasterSp="0">
+  <p:cSld>
+    <p:spTree>
+      <p:nvGrpSpPr>
+        <p:cNvPr id="131" name="Shape 131"/>
+        <p:cNvGrpSpPr/>
+        <p:nvPr/>
+      </p:nvGrpSpPr>
+      <p:grpSpPr>
+        <a:xfrm>
+          <a:off x="0" y="0"/>
+          <a:ext cx="0" cy="0"/>
+          <a:chOff x="0" y="0"/>
+          <a:chExt cx="0" cy="0"/>
+        </a:xfrm>
+      </p:grpSpPr>
+      <p:sp>
+        <p:nvSpPr>
+          <p:cNvPr id="132" name="Google Shape;132;g2d1957346e2_0_5:notes"/>
+          <p:cNvSpPr txBox="1"/>
+          <p:nvPr>
+            <p:ph idx="1" type="body"/>
+          </p:nvPr>
+        </p:nvSpPr>
+        <p:spPr>
+          <a:xfrm>
+            <a:off x="685800" y="4343400"/>
+            <a:ext cx="5486400" cy="4114800"/>
+          </a:xfrm>
+          <a:prstGeom prst="rect">
+            <a:avLst/>
+          </a:prstGeom>
+        </p:spPr>
+        <p:txBody>
+          <a:bodyPr anchorCtr="0" anchor="t" bIns="91425" lIns="91425" spcFirstLastPara="1" rIns="91425" wrap="square" tIns="91425">
+            <a:noAutofit/>
+          </a:bodyPr>
+          <a:lstStyle/>
+          <a:p>
+            <a:pPr indent="0" lvl="0" marL="0" rtl="0" algn="l">
+              <a:spcBef>
+                <a:spcPts val="0"/>
+              </a:spcBef>
+              <a:spcAft>
+                <a:spcPts val="0"/>
+              </a:spcAft>
+              <a:buClr>
+                <a:schemeClr val="dk1"/>
+              </a:buClr>
+              <a:buSzPts val="1100"/>
+              <a:buFont typeface="Arial"/>
+              <a:buNone/>
+            </a:pPr>
+            <a:r>
+              <a:rPr lang="en-US">
+                <a:solidFill>
+                  <a:schemeClr val="dk1"/>
+                </a:solidFill>
+              </a:rPr>
+              <a:t>In a typical machine-learning process, we mainly have four or five steps:</a:t>
+            </a:r>
+            <a:endParaRPr>
+              <a:solidFill>
+                <a:schemeClr val="dk1"/>
+              </a:solidFill>
+            </a:endParaRPr>
+          </a:p>
+          <a:p>
+            <a:pPr indent="0" lvl="0" marL="0" rtl="0" algn="l">
+              <a:spcBef>
+                <a:spcPts val="0"/>
+              </a:spcBef>
+              <a:spcAft>
+                <a:spcPts val="0"/>
+              </a:spcAft>
+              <a:buClr>
+                <a:schemeClr val="dk1"/>
+              </a:buClr>
+              <a:buSzPts val="1100"/>
+              <a:buFont typeface="Arial"/>
+              <a:buNone/>
+            </a:pPr>
+            <a:r>
+              <a:t/>
+            </a:r>
+            <a:endParaRPr>
+              <a:solidFill>
+                <a:schemeClr val="dk1"/>
+              </a:solidFill>
+            </a:endParaRPr>
+          </a:p>
+          <a:p>
+            <a:pPr indent="-298450" lvl="0" marL="457200" rtl="0" algn="l">
+              <a:spcBef>
+                <a:spcPts val="0"/>
+              </a:spcBef>
+              <a:spcAft>
+                <a:spcPts val="0"/>
+              </a:spcAft>
+              <a:buClr>
+                <a:schemeClr val="dk1"/>
+              </a:buClr>
+              <a:buSzPts val="1100"/>
+              <a:buAutoNum type="arabicPeriod"/>
+            </a:pPr>
+            <a:r>
+              <a:rPr lang="en-US">
+                <a:solidFill>
+                  <a:schemeClr val="dk1"/>
+                </a:solidFill>
+              </a:rPr>
+              <a:t>First, we need to have a data-set and </a:t>
+            </a:r>
+            <a:r>
+              <a:rPr b="1" lang="en-US">
+                <a:solidFill>
+                  <a:schemeClr val="dk1"/>
+                </a:solidFill>
+              </a:rPr>
+              <a:t>build a model</a:t>
+            </a:r>
+            <a:r>
+              <a:rPr lang="en-US">
+                <a:solidFill>
+                  <a:schemeClr val="dk1"/>
+                </a:solidFill>
+              </a:rPr>
+              <a:t> according to that.</a:t>
+            </a:r>
+            <a:endParaRPr>
+              <a:solidFill>
+                <a:schemeClr val="dk1"/>
+              </a:solidFill>
+            </a:endParaRPr>
+          </a:p>
+          <a:p>
+            <a:pPr indent="-298450" lvl="0" marL="457200" rtl="0" algn="l">
+              <a:spcBef>
+                <a:spcPts val="0"/>
+              </a:spcBef>
+              <a:spcAft>
+                <a:spcPts val="0"/>
+              </a:spcAft>
+              <a:buClr>
+                <a:schemeClr val="dk1"/>
+              </a:buClr>
+              <a:buSzPts val="1100"/>
+              <a:buAutoNum type="arabicPeriod"/>
+            </a:pPr>
+            <a:r>
+              <a:rPr lang="en-US">
+                <a:solidFill>
+                  <a:schemeClr val="dk1"/>
+                </a:solidFill>
+              </a:rPr>
+              <a:t>Then, we should </a:t>
+            </a:r>
+            <a:r>
+              <a:rPr b="1" lang="en-US">
+                <a:solidFill>
+                  <a:schemeClr val="dk1"/>
+                </a:solidFill>
+              </a:rPr>
+              <a:t>train the model</a:t>
+            </a:r>
+            <a:r>
+              <a:rPr lang="en-US">
+                <a:solidFill>
+                  <a:schemeClr val="dk1"/>
+                </a:solidFill>
+              </a:rPr>
+              <a:t> (for this we should choose an algorithm to tune the parameters of the model).</a:t>
+            </a:r>
+            <a:endParaRPr>
+              <a:solidFill>
+                <a:schemeClr val="dk1"/>
+              </a:solidFill>
+            </a:endParaRPr>
+          </a:p>
+          <a:p>
+            <a:pPr indent="-298450" lvl="0" marL="457200" rtl="0" algn="l">
+              <a:spcBef>
+                <a:spcPts val="0"/>
+              </a:spcBef>
+              <a:spcAft>
+                <a:spcPts val="0"/>
+              </a:spcAft>
+              <a:buClr>
+                <a:schemeClr val="dk1"/>
+              </a:buClr>
+              <a:buSzPts val="1100"/>
+              <a:buAutoNum type="arabicPeriod"/>
+            </a:pPr>
+            <a:r>
+              <a:rPr lang="en-US">
+                <a:solidFill>
+                  <a:schemeClr val="dk1"/>
+                </a:solidFill>
+              </a:rPr>
+              <a:t>After that, for the third step, we need to </a:t>
+            </a:r>
+            <a:r>
+              <a:rPr b="1" lang="en-US">
+                <a:solidFill>
+                  <a:schemeClr val="dk1"/>
+                </a:solidFill>
+              </a:rPr>
+              <a:t>evaluate the model</a:t>
+            </a:r>
+            <a:r>
+              <a:rPr lang="en-US">
+                <a:solidFill>
+                  <a:schemeClr val="dk1"/>
+                </a:solidFill>
+              </a:rPr>
+              <a:t> to see the accuracy of our model on new data. If we are not satisfied with the quality of the model, then we should try to improve it by providing larger training datasets and by choosing different training algorithms with different parameters.</a:t>
+            </a:r>
+            <a:endParaRPr>
+              <a:solidFill>
+                <a:schemeClr val="dk1"/>
+              </a:solidFill>
+            </a:endParaRPr>
+          </a:p>
+          <a:p>
+            <a:pPr indent="-298450" lvl="0" marL="457200" rtl="0" algn="l">
+              <a:spcBef>
+                <a:spcPts val="0"/>
+              </a:spcBef>
+              <a:spcAft>
+                <a:spcPts val="0"/>
+              </a:spcAft>
+              <a:buClr>
+                <a:schemeClr val="dk1"/>
+              </a:buClr>
+              <a:buSzPts val="1100"/>
+              <a:buAutoNum type="arabicPeriod"/>
+            </a:pPr>
+            <a:r>
+              <a:rPr lang="en-US">
+                <a:solidFill>
+                  <a:schemeClr val="dk1"/>
+                </a:solidFill>
+              </a:rPr>
+              <a:t>After evaluating the model and be okay with its accuracy, finally we can </a:t>
+            </a:r>
+            <a:r>
+              <a:rPr b="1" lang="en-US">
+                <a:solidFill>
+                  <a:schemeClr val="dk1"/>
+                </a:solidFill>
+              </a:rPr>
+              <a:t>consume the model</a:t>
+            </a:r>
+            <a:r>
+              <a:rPr lang="en-US">
+                <a:solidFill>
+                  <a:schemeClr val="dk1"/>
+                </a:solidFill>
+              </a:rPr>
+              <a:t>.</a:t>
+            </a:r>
+            <a:endParaRPr>
+              <a:solidFill>
+                <a:schemeClr val="dk1"/>
+              </a:solidFill>
+            </a:endParaRPr>
+          </a:p>
+          <a:p>
+            <a:pPr indent="0" lvl="0" marL="0" rtl="0" algn="l">
+              <a:spcBef>
+                <a:spcPts val="0"/>
+              </a:spcBef>
+              <a:spcAft>
+                <a:spcPts val="0"/>
+              </a:spcAft>
+              <a:buNone/>
+            </a:pPr>
+            <a:r>
+              <a:t/>
+            </a:r>
+            <a:endParaRPr/>
+          </a:p>
+          <a:p>
+            <a:pPr indent="0" lvl="0" marL="0" rtl="0" algn="l">
+              <a:spcBef>
+                <a:spcPts val="0"/>
+              </a:spcBef>
+              <a:spcAft>
+                <a:spcPts val="0"/>
+              </a:spcAft>
+              <a:buNone/>
+            </a:pPr>
+            <a:r>
+              <a:t/>
+            </a:r>
+            <a:endParaRPr/>
+          </a:p>
+          <a:p>
+            <a:pPr indent="0" lvl="0" marL="0" rtl="0" algn="l">
+              <a:spcBef>
+                <a:spcPts val="0"/>
+              </a:spcBef>
+              <a:spcAft>
+                <a:spcPts val="0"/>
+              </a:spcAft>
+              <a:buNone/>
+            </a:pPr>
+            <a:r>
+              <a:rPr lang="en-US"/>
+              <a:t>If you look at these flow, for our example, we have the same step by step flow, and I will show you that on the code.</a:t>
+            </a:r>
+            <a:endParaRPr/>
+          </a:p>
+          <a:p>
+            <a:pPr indent="0" lvl="0" marL="0" rtl="0" algn="l">
+              <a:spcBef>
+                <a:spcPts val="0"/>
+              </a:spcBef>
+              <a:spcAft>
+                <a:spcPts val="0"/>
+              </a:spcAft>
+              <a:buNone/>
+            </a:pPr>
+            <a:r>
+              <a:t/>
+            </a:r>
+            <a:endParaRPr/>
+          </a:p>
+          <a:p>
+            <a:pPr indent="0" lvl="0" marL="0" rtl="0" algn="l">
+              <a:spcBef>
+                <a:spcPts val="0"/>
+              </a:spcBef>
+              <a:spcAft>
+                <a:spcPts val="0"/>
+              </a:spcAft>
+              <a:buNone/>
+            </a:pPr>
+            <a:r>
+              <a:rPr lang="en-US"/>
+              <a:t>We will first add a comment, then a machine-learning model will be build and make a sentiment analysis, the model will evaluate the results and will predict a result for us (either positive or negative) and then the system will approve or reject our comment in the background.</a:t>
+            </a:r>
+            <a:endParaRPr/>
+          </a:p>
+          <a:p>
+            <a:pPr indent="0" lvl="0" marL="0" rtl="0" algn="l">
+              <a:spcBef>
+                <a:spcPts val="0"/>
+              </a:spcBef>
+              <a:spcAft>
+                <a:spcPts val="0"/>
+              </a:spcAft>
+              <a:buNone/>
+            </a:pPr>
+            <a:r>
+              <a:t/>
+            </a:r>
+            <a:endParaRPr/>
+          </a:p>
+          <a:p>
+            <a:pPr indent="0" lvl="0" marL="0" rtl="0" algn="l">
+              <a:spcBef>
+                <a:spcPts val="0"/>
+              </a:spcBef>
+              <a:spcAft>
+                <a:spcPts val="0"/>
+              </a:spcAft>
+              <a:buNone/>
+            </a:pPr>
+            <a:r>
+              <a:rPr lang="en-US"/>
+              <a:t>Now, Let’s see the demo in action and then deep dive into the code.</a:t>
+            </a:r>
+            <a:endParaRPr/>
+          </a:p>
+        </p:txBody>
+      </p:sp>
+      <p:sp>
+        <p:nvSpPr>
+          <p:cNvPr id="133" name="Google Shape;133;g2d1957346e2_0_5:notes"/>
           <p:cNvSpPr/>
           <p:nvPr>
             <p:ph idx="2" type="sldImg"/>
@@ -1470,12 +2174,12 @@
 </p:notes>
 </file>
 
-<file path=ppt/notesSlides/notesSlide7.xml><?xml version="1.0" encoding="utf-8"?>
+<file path=ppt/notesSlides/notesSlide8.xml><?xml version="1.0" encoding="utf-8"?>
 <p:notes xmlns:a="http://schemas.openxmlformats.org/drawingml/2006/main" xmlns:r="http://schemas.openxmlformats.org/officeDocument/2006/relationships" xmlns:mc="http://schemas.openxmlformats.org/markup-compatibility/2006" xmlns:mv="urn:schemas-microsoft-com:mac:vml" xmlns:p="http://schemas.openxmlformats.org/presentationml/2006/main" xmlns:c="http://schemas.openxmlformats.org/drawingml/2006/chart" xmlns:dgm="http://schemas.openxmlformats.org/drawingml/2006/diagram" xmlns:o="urn:schemas-microsoft-com:office:office" xmlns:v="urn:schemas-microsoft-com:vml" xmlns:pvml="urn:schemas-microsoft-com:office:powerpoint" xmlns:com="http://schemas.openxmlformats.org/drawingml/2006/compatibility" xmlns:p14="http://schemas.microsoft.com/office/powerpoint/2010/main" xmlns:p15="http://schemas.microsoft.com/office/powerpoint/2012/main" xmlns:ahyp="http://schemas.microsoft.com/office/drawing/2018/hyperlinkcolor" showMasterPhAnim="0" showMasterSp="0">
   <p:cSld>
     <p:spTree>
       <p:nvGrpSpPr>
-        <p:cNvPr id="138" name="Shape 138"/>
+        <p:cNvPr id="158" name="Shape 158"/>
         <p:cNvGrpSpPr/>
         <p:nvPr/>
       </p:nvGrpSpPr>
@@ -1489,7 +2193,7 @@
       </p:grpSpPr>
       <p:sp>
         <p:nvSpPr>
-          <p:cNvPr id="139" name="Google Shape;139;p11:notes"/>
+          <p:cNvPr id="159" name="Google Shape;159;g2d159c2ab0f_0_31:notes"/>
           <p:cNvSpPr txBox="1"/>
           <p:nvPr>
             <p:ph idx="1" type="body"/>
@@ -1511,6 +2215,9 @@
           <a:lstStyle/>
           <a:p>
             <a:pPr indent="0" lvl="0" marL="0" rtl="0" algn="l">
+              <a:lnSpc>
+                <a:spcPct val="150000"/>
+              </a:lnSpc>
               <a:spcBef>
                 <a:spcPts val="0"/>
               </a:spcBef>
@@ -1525,14 +2232,22 @@
               <a:buNone/>
             </a:pPr>
             <a:r>
-              <a:rPr lang="en-US">
+              <a:rPr b="1" lang="en-US" sz="1200">
                 <a:solidFill>
                   <a:schemeClr val="dk1"/>
                 </a:solidFill>
               </a:rPr>
-              <a:t>In a typical machine-learning process, we mainly have four or five steps:</a:t>
+              <a:t>Note: </a:t>
             </a:r>
-            <a:endParaRPr>
+            <a:r>
+              <a:rPr lang="en-US" sz="1200">
+                <a:solidFill>
+                  <a:schemeClr val="dk1"/>
+                </a:solidFill>
+              </a:rPr>
+              <a:t>Before using the model, it should be tested against the splitted test data. Accuracy and other metrics should be evaluated and if it does not meet the criterias then a new algorithm should be selected and the dataset should be populated.</a:t>
+            </a:r>
+            <a:endParaRPr sz="1200">
               <a:solidFill>
                 <a:schemeClr val="dk1"/>
               </a:solidFill>
@@ -1546,311 +2261,18 @@
               <a:spcAft>
                 <a:spcPts val="0"/>
               </a:spcAft>
-              <a:buClr>
-                <a:schemeClr val="dk1"/>
-              </a:buClr>
-              <a:buSzPts val="1100"/>
-              <a:buFont typeface="Arial"/>
               <a:buNone/>
             </a:pPr>
             <a:r>
               <a:t/>
             </a:r>
-            <a:endParaRPr>
-              <a:solidFill>
-                <a:schemeClr val="dk1"/>
-              </a:solidFill>
-            </a:endParaRPr>
-          </a:p>
-          <a:p>
-            <a:pPr indent="-298450" lvl="0" marL="457200" rtl="0" algn="l">
-              <a:spcBef>
-                <a:spcPts val="0"/>
-              </a:spcBef>
-              <a:spcAft>
-                <a:spcPts val="0"/>
-              </a:spcAft>
-              <a:buClr>
-                <a:schemeClr val="dk1"/>
-              </a:buClr>
-              <a:buSzPts val="1100"/>
-              <a:buAutoNum type="arabicPeriod"/>
-            </a:pPr>
-            <a:r>
-              <a:rPr lang="en-US">
-                <a:solidFill>
-                  <a:schemeClr val="dk1"/>
-                </a:solidFill>
-              </a:rPr>
-              <a:t>First, we need to have a data-set and </a:t>
-            </a:r>
-            <a:r>
-              <a:rPr b="1" lang="en-US">
-                <a:solidFill>
-                  <a:schemeClr val="dk1"/>
-                </a:solidFill>
-              </a:rPr>
-              <a:t>build a model</a:t>
-            </a:r>
-            <a:r>
-              <a:rPr lang="en-US">
-                <a:solidFill>
-                  <a:schemeClr val="dk1"/>
-                </a:solidFill>
-              </a:rPr>
-              <a:t> according to that.</a:t>
-            </a:r>
-            <a:endParaRPr>
-              <a:solidFill>
-                <a:schemeClr val="dk1"/>
-              </a:solidFill>
-            </a:endParaRPr>
-          </a:p>
-          <a:p>
-            <a:pPr indent="-298450" lvl="0" marL="457200" rtl="0" algn="l">
-              <a:spcBef>
-                <a:spcPts val="0"/>
-              </a:spcBef>
-              <a:spcAft>
-                <a:spcPts val="0"/>
-              </a:spcAft>
-              <a:buClr>
-                <a:schemeClr val="dk1"/>
-              </a:buClr>
-              <a:buSzPts val="1100"/>
-              <a:buAutoNum type="arabicPeriod"/>
-            </a:pPr>
-            <a:r>
-              <a:rPr lang="en-US">
-                <a:solidFill>
-                  <a:schemeClr val="dk1"/>
-                </a:solidFill>
-              </a:rPr>
-              <a:t>Then, we should </a:t>
-            </a:r>
-            <a:r>
-              <a:rPr b="1" lang="en-US">
-                <a:solidFill>
-                  <a:schemeClr val="dk1"/>
-                </a:solidFill>
-              </a:rPr>
-              <a:t>train the model</a:t>
-            </a:r>
-            <a:r>
-              <a:rPr lang="en-US">
-                <a:solidFill>
-                  <a:schemeClr val="dk1"/>
-                </a:solidFill>
-              </a:rPr>
-              <a:t> (for this we should choose an algorithm to tune the parameters of the model).</a:t>
-            </a:r>
-            <a:endParaRPr>
-              <a:solidFill>
-                <a:schemeClr val="dk1"/>
-              </a:solidFill>
-            </a:endParaRPr>
-          </a:p>
-          <a:p>
-            <a:pPr indent="-298450" lvl="0" marL="457200" rtl="0" algn="l">
-              <a:spcBef>
-                <a:spcPts val="0"/>
-              </a:spcBef>
-              <a:spcAft>
-                <a:spcPts val="0"/>
-              </a:spcAft>
-              <a:buClr>
-                <a:schemeClr val="dk1"/>
-              </a:buClr>
-              <a:buSzPts val="1100"/>
-              <a:buAutoNum type="arabicPeriod"/>
-            </a:pPr>
-            <a:r>
-              <a:rPr lang="en-US">
-                <a:solidFill>
-                  <a:schemeClr val="dk1"/>
-                </a:solidFill>
-              </a:rPr>
-              <a:t>After that, for the third step, we need to </a:t>
-            </a:r>
-            <a:r>
-              <a:rPr b="1" lang="en-US">
-                <a:solidFill>
-                  <a:schemeClr val="dk1"/>
-                </a:solidFill>
-              </a:rPr>
-              <a:t>evaluate the model</a:t>
-            </a:r>
-            <a:r>
-              <a:rPr lang="en-US">
-                <a:solidFill>
-                  <a:schemeClr val="dk1"/>
-                </a:solidFill>
-              </a:rPr>
-              <a:t> to see the accuracy of our model on new data. If we are not satisfied with the quality of the model, then we should try to improve it by providing larger training datasets and by choosing different training algorithms with different parameters.</a:t>
-            </a:r>
-            <a:endParaRPr>
-              <a:solidFill>
-                <a:schemeClr val="dk1"/>
-              </a:solidFill>
-            </a:endParaRPr>
-          </a:p>
-          <a:p>
-            <a:pPr indent="-298450" lvl="0" marL="457200" rtl="0" algn="l">
-              <a:spcBef>
-                <a:spcPts val="0"/>
-              </a:spcBef>
-              <a:spcAft>
-                <a:spcPts val="0"/>
-              </a:spcAft>
-              <a:buClr>
-                <a:schemeClr val="dk1"/>
-              </a:buClr>
-              <a:buSzPts val="1100"/>
-              <a:buAutoNum type="arabicPeriod"/>
-            </a:pPr>
-            <a:r>
-              <a:rPr lang="en-US">
-                <a:solidFill>
-                  <a:schemeClr val="dk1"/>
-                </a:solidFill>
-              </a:rPr>
-              <a:t>After evaluating the model and be okay with its accuracy, finally we can </a:t>
-            </a:r>
-            <a:r>
-              <a:rPr b="1" lang="en-US">
-                <a:solidFill>
-                  <a:schemeClr val="dk1"/>
-                </a:solidFill>
-              </a:rPr>
-              <a:t>consume the model</a:t>
-            </a:r>
-            <a:r>
-              <a:rPr lang="en-US">
-                <a:solidFill>
-                  <a:schemeClr val="dk1"/>
-                </a:solidFill>
-              </a:rPr>
-              <a:t>.</a:t>
-            </a:r>
-            <a:endParaRPr>
-              <a:solidFill>
-                <a:schemeClr val="dk1"/>
-              </a:solidFill>
-            </a:endParaRPr>
-          </a:p>
-          <a:p>
-            <a:pPr indent="0" lvl="0" marL="0" rtl="0" algn="l">
-              <a:spcBef>
-                <a:spcPts val="0"/>
-              </a:spcBef>
-              <a:spcAft>
-                <a:spcPts val="0"/>
-              </a:spcAft>
-              <a:buNone/>
-            </a:pPr>
-            <a:r>
-              <a:t/>
-            </a:r>
-            <a:endParaRPr/>
-          </a:p>
-          <a:p>
-            <a:pPr indent="0" lvl="0" marL="0" rtl="0" algn="l">
-              <a:spcBef>
-                <a:spcPts val="0"/>
-              </a:spcBef>
-              <a:spcAft>
-                <a:spcPts val="0"/>
-              </a:spcAft>
-              <a:buNone/>
-            </a:pPr>
-            <a:r>
-              <a:t/>
-            </a:r>
-            <a:endParaRPr/>
-          </a:p>
-          <a:p>
-            <a:pPr indent="0" lvl="0" marL="0" rtl="0" algn="l">
-              <a:spcBef>
-                <a:spcPts val="0"/>
-              </a:spcBef>
-              <a:spcAft>
-                <a:spcPts val="0"/>
-              </a:spcAft>
-              <a:buNone/>
-            </a:pPr>
-            <a:r>
-              <a:rPr lang="en-US"/>
-              <a:t>If you look at these flow, for our example, we have the same step by step flow, and I will show you that on the code.</a:t>
-            </a:r>
-            <a:endParaRPr/>
-          </a:p>
-          <a:p>
-            <a:pPr indent="0" lvl="0" marL="0" rtl="0" algn="l">
-              <a:spcBef>
-                <a:spcPts val="0"/>
-              </a:spcBef>
-              <a:spcAft>
-                <a:spcPts val="0"/>
-              </a:spcAft>
-              <a:buNone/>
-            </a:pPr>
-            <a:r>
-              <a:t/>
-            </a:r>
-            <a:endParaRPr/>
-          </a:p>
-          <a:p>
-            <a:pPr indent="0" lvl="0" marL="0" rtl="0" algn="l">
-              <a:spcBef>
-                <a:spcPts val="0"/>
-              </a:spcBef>
-              <a:spcAft>
-                <a:spcPts val="0"/>
-              </a:spcAft>
-              <a:buNone/>
-            </a:pPr>
-            <a:r>
-              <a:rPr lang="en-US"/>
-              <a:t>We will first add a comment, then a machine-learning model will be build and make a sentiment analysis, the model will evaluate the results and will predict a result for us (either positive or negative) and then the system will approve or reject our comment in the background.</a:t>
-            </a:r>
-            <a:endParaRPr/>
-          </a:p>
-          <a:p>
-            <a:pPr indent="0" lvl="0" marL="0" rtl="0" algn="l">
-              <a:spcBef>
-                <a:spcPts val="0"/>
-              </a:spcBef>
-              <a:spcAft>
-                <a:spcPts val="0"/>
-              </a:spcAft>
-              <a:buNone/>
-            </a:pPr>
-            <a:r>
-              <a:t/>
-            </a:r>
-            <a:endParaRPr/>
-          </a:p>
-          <a:p>
-            <a:pPr indent="0" lvl="0" marL="0" rtl="0" algn="l">
-              <a:spcBef>
-                <a:spcPts val="0"/>
-              </a:spcBef>
-              <a:spcAft>
-                <a:spcPts val="0"/>
-              </a:spcAft>
-              <a:buNone/>
-            </a:pPr>
-            <a:r>
-              <a:rPr lang="en-US"/>
-              <a:t>Now, Let’s see the demo in action and then deep dive into the code.</a:t>
-            </a:r>
-            <a:endParaRPr/>
+            <a:endParaRPr sz="200"/>
           </a:p>
         </p:txBody>
       </p:sp>
       <p:sp>
         <p:nvSpPr>
-          <p:cNvPr id="140" name="Google Shape;140;p11:notes"/>
+          <p:cNvPr id="160" name="Google Shape;160;g2d159c2ab0f_0_31:notes"/>
           <p:cNvSpPr/>
           <p:nvPr>
             <p:ph idx="2" type="sldImg"/>
@@ -1859,7 +2281,7 @@
         <p:spPr>
           <a:xfrm>
             <a:off x="1143225" y="685800"/>
-            <a:ext cx="4572225" cy="3429000"/>
+            <a:ext cx="4572300" cy="3429000"/>
           </a:xfrm>
           <a:custGeom>
             <a:rect b="b" l="l" r="r" t="t"/>
@@ -1891,12 +2313,12 @@
 </p:notes>
 </file>
 
-<file path=ppt/notesSlides/notesSlide8.xml><?xml version="1.0" encoding="utf-8"?>
+<file path=ppt/notesSlides/notesSlide9.xml><?xml version="1.0" encoding="utf-8"?>
 <p:notes xmlns:a="http://schemas.openxmlformats.org/drawingml/2006/main" xmlns:r="http://schemas.openxmlformats.org/officeDocument/2006/relationships" xmlns:mc="http://schemas.openxmlformats.org/markup-compatibility/2006" xmlns:mv="urn:schemas-microsoft-com:mac:vml" xmlns:p="http://schemas.openxmlformats.org/presentationml/2006/main" xmlns:c="http://schemas.openxmlformats.org/drawingml/2006/chart" xmlns:dgm="http://schemas.openxmlformats.org/drawingml/2006/diagram" xmlns:o="urn:schemas-microsoft-com:office:office" xmlns:v="urn:schemas-microsoft-com:vml" xmlns:pvml="urn:schemas-microsoft-com:office:powerpoint" xmlns:com="http://schemas.openxmlformats.org/drawingml/2006/compatibility" xmlns:p14="http://schemas.microsoft.com/office/powerpoint/2010/main" xmlns:p15="http://schemas.microsoft.com/office/powerpoint/2012/main" xmlns:ahyp="http://schemas.microsoft.com/office/drawing/2018/hyperlinkcolor" showMasterPhAnim="0" showMasterSp="0">
   <p:cSld>
     <p:spTree>
       <p:nvGrpSpPr>
-        <p:cNvPr id="164" name="Shape 164"/>
+        <p:cNvPr id="171" name="Shape 171"/>
         <p:cNvGrpSpPr/>
         <p:nvPr/>
       </p:nvGrpSpPr>
@@ -1910,7 +2332,7 @@
       </p:grpSpPr>
       <p:sp>
         <p:nvSpPr>
-          <p:cNvPr id="165" name="Google Shape;165;p20:notes"/>
+          <p:cNvPr id="172" name="Google Shape;172;p20:notes"/>
           <p:cNvSpPr txBox="1"/>
           <p:nvPr>
             <p:ph idx="1" type="body"/>
@@ -1949,7 +2371,7 @@
       </p:sp>
       <p:sp>
         <p:nvSpPr>
-          <p:cNvPr id="166" name="Google Shape;166;p20:notes"/>
+          <p:cNvPr id="173" name="Google Shape;173;p20:notes"/>
           <p:cNvSpPr/>
           <p:nvPr>
             <p:ph idx="2" type="sldImg"/>
@@ -6357,7 +6779,7 @@
               </a:pPr>
               <a:r>
                 <a:rPr lang="en-US" sz="2400"/>
-                <a:t>What is the ML.NET library used for?</a:t>
+                <a:t>What is the ML.NET framework used for?</a:t>
               </a:r>
               <a:endParaRPr/>
             </a:p>
@@ -7275,7 +7697,7 @@
             <a:tbl>
               <a:tblPr>
                 <a:noFill/>
-                <a:tableStyleId>{159EED66-68F7-4B2C-B27E-84E680B6CAAB}</a:tableStyleId>
+                <a:tableStyleId>{AC59D6B9-F14A-4061-BA49-7362A11DA029}</a:tableStyleId>
               </a:tblPr>
               <a:tblGrid>
                 <a:gridCol w="8128975"/>
@@ -8924,7 +9346,7 @@
               <a:srgbClr val="94B9FF"/>
             </a:gs>
           </a:gsLst>
-          <a:lin ang="5400012" scaled="0"/>
+          <a:lin ang="5400000" scaled="0"/>
         </a:gradFill>
       </p:bgPr>
     </p:bg>
@@ -8950,7 +9372,200 @@
         </p:nvSpPr>
         <p:spPr>
           <a:xfrm>
-            <a:off x="1216551" y="6503850"/>
+            <a:off x="1028700" y="628650"/>
+            <a:ext cx="16230600" cy="2878500"/>
+          </a:xfrm>
+          <a:prstGeom prst="rect">
+            <a:avLst/>
+          </a:prstGeom>
+          <a:noFill/>
+          <a:ln>
+            <a:noFill/>
+          </a:ln>
+        </p:spPr>
+        <p:txBody>
+          <a:bodyPr anchorCtr="0" anchor="t" bIns="0" lIns="0" spcFirstLastPara="1" rIns="0" wrap="square" tIns="0">
+            <a:spAutoFit/>
+          </a:bodyPr>
+          <a:lstStyle/>
+          <a:p>
+            <a:pPr indent="0" lvl="0" marL="0" rtl="0" algn="ctr">
+              <a:lnSpc>
+                <a:spcPct val="120000"/>
+              </a:lnSpc>
+              <a:spcBef>
+                <a:spcPts val="0"/>
+              </a:spcBef>
+              <a:spcAft>
+                <a:spcPts val="0"/>
+              </a:spcAft>
+              <a:buNone/>
+            </a:pPr>
+            <a:r>
+              <a:rPr lang="en-US" sz="5500">
+                <a:solidFill>
+                  <a:schemeClr val="dk1"/>
+                </a:solidFill>
+                <a:latin typeface="Archivo Black"/>
+                <a:ea typeface="Archivo Black"/>
+                <a:cs typeface="Archivo Black"/>
+                <a:sym typeface="Archivo Black"/>
+              </a:rPr>
+              <a:t>Demo: Applying Sentiment Analysis to CMS Kit’s Commenting Feature</a:t>
+            </a:r>
+            <a:endParaRPr sz="200"/>
+          </a:p>
+          <a:p>
+            <a:pPr indent="0" lvl="0" marL="0" marR="0" rtl="0" algn="ctr">
+              <a:lnSpc>
+                <a:spcPct val="120000"/>
+              </a:lnSpc>
+              <a:spcBef>
+                <a:spcPts val="0"/>
+              </a:spcBef>
+              <a:spcAft>
+                <a:spcPts val="0"/>
+              </a:spcAft>
+              <a:buNone/>
+            </a:pPr>
+            <a:r>
+              <a:t/>
+            </a:r>
+            <a:endParaRPr sz="5500">
+              <a:solidFill>
+                <a:srgbClr val="1557FF"/>
+              </a:solidFill>
+              <a:latin typeface="Archivo Black"/>
+              <a:ea typeface="Archivo Black"/>
+              <a:cs typeface="Archivo Black"/>
+              <a:sym typeface="Archivo Black"/>
+            </a:endParaRPr>
+          </a:p>
+        </p:txBody>
+      </p:sp>
+      <p:pic>
+        <p:nvPicPr>
+          <p:cNvPr id="130" name="Google Shape;130;p14"/>
+          <p:cNvPicPr preferRelativeResize="0"/>
+          <p:nvPr/>
+        </p:nvPicPr>
+        <p:blipFill/>
+        <p:spPr>
+          <a:xfrm>
+            <a:off x="2294013" y="2950700"/>
+            <a:ext cx="13699972" cy="6839249"/>
+          </a:xfrm>
+          <a:prstGeom prst="rect">
+            <a:avLst/>
+          </a:prstGeom>
+          <a:noFill/>
+          <a:ln>
+            <a:noFill/>
+          </a:ln>
+        </p:spPr>
+      </p:pic>
+    </p:spTree>
+  </p:cSld>
+  <p:clrMapOvr>
+    <a:masterClrMapping/>
+  </p:clrMapOvr>
+</p:sld>
+</file>
+
+<file path=ppt/slides/slide7.xml><?xml version="1.0" encoding="utf-8"?>
+<p:sld xmlns:a="http://schemas.openxmlformats.org/drawingml/2006/main" xmlns:r="http://schemas.openxmlformats.org/officeDocument/2006/relationships" xmlns:mc="http://schemas.openxmlformats.org/markup-compatibility/2006" xmlns:mv="urn:schemas-microsoft-com:mac:vml" xmlns:p="http://schemas.openxmlformats.org/presentationml/2006/main" xmlns:c="http://schemas.openxmlformats.org/drawingml/2006/chart" xmlns:dgm="http://schemas.openxmlformats.org/drawingml/2006/diagram" xmlns:o="urn:schemas-microsoft-com:office:office" xmlns:v="urn:schemas-microsoft-com:vml" xmlns:pvml="urn:schemas-microsoft-com:office:powerpoint" xmlns:com="http://schemas.openxmlformats.org/drawingml/2006/compatibility" xmlns:p14="http://schemas.microsoft.com/office/powerpoint/2010/main" xmlns:p15="http://schemas.microsoft.com/office/powerpoint/2012/main" xmlns:ahyp="http://schemas.microsoft.com/office/drawing/2018/hyperlinkcolor">
+  <p:cSld>
+    <p:bg>
+      <p:bgPr>
+        <a:gradFill>
+          <a:gsLst>
+            <a:gs pos="0">
+              <a:srgbClr val="CDFFD8"/>
+            </a:gs>
+            <a:gs pos="100000">
+              <a:srgbClr val="94B9FF"/>
+            </a:gs>
+          </a:gsLst>
+          <a:lin ang="5400012" scaled="0"/>
+        </a:gradFill>
+      </p:bgPr>
+    </p:bg>
+    <p:spTree>
+      <p:nvGrpSpPr>
+        <p:cNvPr id="134" name="Shape 134"/>
+        <p:cNvGrpSpPr/>
+        <p:nvPr/>
+      </p:nvGrpSpPr>
+      <p:grpSpPr>
+        <a:xfrm>
+          <a:off x="0" y="0"/>
+          <a:ext cx="0" cy="0"/>
+          <a:chOff x="0" y="0"/>
+          <a:chExt cx="0" cy="0"/>
+        </a:xfrm>
+      </p:grpSpPr>
+      <p:sp>
+        <p:nvSpPr>
+          <p:cNvPr id="135" name="Google Shape;135;p15"/>
+          <p:cNvSpPr txBox="1"/>
+          <p:nvPr/>
+        </p:nvSpPr>
+        <p:spPr>
+          <a:xfrm>
+            <a:off x="1028700" y="1009650"/>
+            <a:ext cx="16230600" cy="969600"/>
+          </a:xfrm>
+          <a:prstGeom prst="rect">
+            <a:avLst/>
+          </a:prstGeom>
+          <a:noFill/>
+          <a:ln>
+            <a:noFill/>
+          </a:ln>
+        </p:spPr>
+        <p:txBody>
+          <a:bodyPr anchorCtr="0" anchor="t" bIns="0" lIns="0" spcFirstLastPara="1" rIns="0" wrap="square" tIns="0">
+            <a:spAutoFit/>
+          </a:bodyPr>
+          <a:lstStyle/>
+          <a:p>
+            <a:pPr indent="0" lvl="0" marL="0" marR="0" rtl="0" algn="ctr">
+              <a:lnSpc>
+                <a:spcPct val="120000"/>
+              </a:lnSpc>
+              <a:spcBef>
+                <a:spcPts val="0"/>
+              </a:spcBef>
+              <a:spcAft>
+                <a:spcPts val="0"/>
+              </a:spcAft>
+              <a:buNone/>
+            </a:pPr>
+            <a:r>
+              <a:rPr lang="en-US" sz="6300">
+                <a:solidFill>
+                  <a:srgbClr val="1557FF"/>
+                </a:solidFill>
+                <a:latin typeface="Archivo Black"/>
+                <a:ea typeface="Archivo Black"/>
+                <a:cs typeface="Archivo Black"/>
+                <a:sym typeface="Archivo Black"/>
+              </a:rPr>
+              <a:t>Demo: Spam Detection</a:t>
+            </a:r>
+            <a:endParaRPr sz="200"/>
+          </a:p>
+        </p:txBody>
+      </p:sp>
+      <p:sp>
+        <p:nvSpPr>
+          <p:cNvPr id="136" name="Google Shape;136;p15"/>
+          <p:cNvSpPr txBox="1"/>
+          <p:nvPr/>
+        </p:nvSpPr>
+        <p:spPr>
+          <a:xfrm>
+            <a:off x="1216551" y="5894250"/>
             <a:ext cx="3355500" cy="400200"/>
           </a:xfrm>
           <a:prstGeom prst="rect">
@@ -8992,15 +9607,225 @@
           </a:p>
         </p:txBody>
       </p:sp>
+      <p:cxnSp>
+        <p:nvCxnSpPr>
+          <p:cNvPr id="137" name="Google Shape;137;p15"/>
+          <p:cNvCxnSpPr/>
+          <p:nvPr/>
+        </p:nvCxnSpPr>
+        <p:spPr>
+          <a:xfrm>
+            <a:off x="1028700" y="4607694"/>
+            <a:ext cx="15868200" cy="0"/>
+          </a:xfrm>
+          <a:prstGeom prst="straightConnector1">
+            <a:avLst/>
+          </a:prstGeom>
+          <a:noFill/>
+          <a:ln cap="flat" cmpd="sng" w="47625">
+            <a:solidFill>
+              <a:srgbClr val="4F7DCF"/>
+            </a:solidFill>
+            <a:prstDash val="solid"/>
+            <a:round/>
+            <a:headEnd len="sm" w="sm" type="none"/>
+            <a:tailEnd len="sm" w="sm" type="none"/>
+          </a:ln>
+        </p:spPr>
+      </p:cxnSp>
+      <p:sp>
+        <p:nvSpPr>
+          <p:cNvPr id="138" name="Google Shape;138;p15"/>
+          <p:cNvSpPr txBox="1"/>
+          <p:nvPr/>
+        </p:nvSpPr>
+        <p:spPr>
+          <a:xfrm>
+            <a:off x="5089448" y="5894238"/>
+            <a:ext cx="3690000" cy="880500"/>
+          </a:xfrm>
+          <a:prstGeom prst="rect">
+            <a:avLst/>
+          </a:prstGeom>
+          <a:noFill/>
+          <a:ln>
+            <a:noFill/>
+          </a:ln>
+        </p:spPr>
+        <p:txBody>
+          <a:bodyPr anchorCtr="0" anchor="t" bIns="0" lIns="0" spcFirstLastPara="1" rIns="0" wrap="square" tIns="0">
+            <a:spAutoFit/>
+          </a:bodyPr>
+          <a:lstStyle/>
+          <a:p>
+            <a:pPr indent="0" lvl="0" marL="0" marR="0" rtl="0" algn="ctr">
+              <a:lnSpc>
+                <a:spcPct val="120000"/>
+              </a:lnSpc>
+              <a:spcBef>
+                <a:spcPts val="0"/>
+              </a:spcBef>
+              <a:spcAft>
+                <a:spcPts val="0"/>
+              </a:spcAft>
+              <a:buNone/>
+            </a:pPr>
+            <a:r>
+              <a:rPr b="1" lang="en-US" sz="2600">
+                <a:latin typeface="Montserrat"/>
+                <a:ea typeface="Montserrat"/>
+                <a:cs typeface="Montserrat"/>
+                <a:sym typeface="Montserrat"/>
+              </a:rPr>
+              <a:t>Sentiment Analysis</a:t>
+            </a:r>
+            <a:endParaRPr b="1" sz="2600">
+              <a:latin typeface="Montserrat"/>
+              <a:ea typeface="Montserrat"/>
+              <a:cs typeface="Montserrat"/>
+              <a:sym typeface="Montserrat"/>
+            </a:endParaRPr>
+          </a:p>
+          <a:p>
+            <a:pPr indent="0" lvl="0" marL="0" marR="0" rtl="0" algn="ctr">
+              <a:lnSpc>
+                <a:spcPct val="120000"/>
+              </a:lnSpc>
+              <a:spcBef>
+                <a:spcPts val="0"/>
+              </a:spcBef>
+              <a:spcAft>
+                <a:spcPts val="0"/>
+              </a:spcAft>
+              <a:buNone/>
+            </a:pPr>
+            <a:r>
+              <a:rPr b="1" lang="en-US" sz="2600">
+                <a:latin typeface="Montserrat"/>
+                <a:ea typeface="Montserrat"/>
+                <a:cs typeface="Montserrat"/>
+                <a:sym typeface="Montserrat"/>
+              </a:rPr>
+              <a:t>(Spam Detection)</a:t>
+            </a:r>
+            <a:endParaRPr b="1" sz="2600">
+              <a:latin typeface="Montserrat"/>
+              <a:ea typeface="Montserrat"/>
+              <a:cs typeface="Montserrat"/>
+              <a:sym typeface="Montserrat"/>
+            </a:endParaRPr>
+          </a:p>
+        </p:txBody>
+      </p:sp>
+      <p:sp>
+        <p:nvSpPr>
+          <p:cNvPr id="139" name="Google Shape;139;p15"/>
+          <p:cNvSpPr txBox="1"/>
+          <p:nvPr/>
+        </p:nvSpPr>
+        <p:spPr>
+          <a:xfrm>
+            <a:off x="9296849" y="5894288"/>
+            <a:ext cx="3355500" cy="400200"/>
+          </a:xfrm>
+          <a:prstGeom prst="rect">
+            <a:avLst/>
+          </a:prstGeom>
+          <a:noFill/>
+          <a:ln>
+            <a:noFill/>
+          </a:ln>
+        </p:spPr>
+        <p:txBody>
+          <a:bodyPr anchorCtr="0" anchor="t" bIns="0" lIns="0" spcFirstLastPara="1" rIns="0" wrap="square" tIns="0">
+            <a:spAutoFit/>
+          </a:bodyPr>
+          <a:lstStyle/>
+          <a:p>
+            <a:pPr indent="0" lvl="0" marL="0" marR="0" rtl="0" algn="ctr">
+              <a:lnSpc>
+                <a:spcPct val="120000"/>
+              </a:lnSpc>
+              <a:spcBef>
+                <a:spcPts val="0"/>
+              </a:spcBef>
+              <a:spcAft>
+                <a:spcPts val="0"/>
+              </a:spcAft>
+              <a:buNone/>
+            </a:pPr>
+            <a:r>
+              <a:rPr b="1" lang="en-US" sz="2600">
+                <a:latin typeface="Montserrat"/>
+                <a:ea typeface="Montserrat"/>
+                <a:cs typeface="Montserrat"/>
+                <a:sym typeface="Montserrat"/>
+              </a:rPr>
+              <a:t>Evaluate Results</a:t>
+            </a:r>
+            <a:endParaRPr/>
+          </a:p>
+        </p:txBody>
+      </p:sp>
+      <p:sp>
+        <p:nvSpPr>
+          <p:cNvPr id="140" name="Google Shape;140;p15"/>
+          <p:cNvSpPr txBox="1"/>
+          <p:nvPr/>
+        </p:nvSpPr>
+        <p:spPr>
+          <a:xfrm>
+            <a:off x="13175625" y="5861513"/>
+            <a:ext cx="3594600" cy="880500"/>
+          </a:xfrm>
+          <a:prstGeom prst="rect">
+            <a:avLst/>
+          </a:prstGeom>
+          <a:noFill/>
+          <a:ln>
+            <a:noFill/>
+          </a:ln>
+        </p:spPr>
+        <p:txBody>
+          <a:bodyPr anchorCtr="0" anchor="t" bIns="0" lIns="0" spcFirstLastPara="1" rIns="0" wrap="square" tIns="0">
+            <a:spAutoFit/>
+          </a:bodyPr>
+          <a:lstStyle/>
+          <a:p>
+            <a:pPr indent="0" lvl="0" marL="0" marR="0" rtl="0" algn="ctr">
+              <a:lnSpc>
+                <a:spcPct val="120000"/>
+              </a:lnSpc>
+              <a:spcBef>
+                <a:spcPts val="0"/>
+              </a:spcBef>
+              <a:spcAft>
+                <a:spcPts val="0"/>
+              </a:spcAft>
+              <a:buNone/>
+            </a:pPr>
+            <a:r>
+              <a:rPr b="1" lang="en-US" sz="2600">
+                <a:latin typeface="Montserrat"/>
+                <a:ea typeface="Montserrat"/>
+                <a:cs typeface="Montserrat"/>
+                <a:sym typeface="Montserrat"/>
+              </a:rPr>
+              <a:t>Approve or Reject the Comment</a:t>
+            </a:r>
+            <a:endParaRPr/>
+          </a:p>
+        </p:txBody>
+      </p:sp>
       <p:grpSp>
         <p:nvGrpSpPr>
-          <p:cNvPr id="130" name="Google Shape;130;p14"/>
+          <p:cNvPr id="141" name="Google Shape;141;p15"/>
           <p:cNvGrpSpPr/>
           <p:nvPr/>
         </p:nvGrpSpPr>
         <p:grpSpPr>
           <a:xfrm>
-            <a:off x="1927205" y="4318650"/>
+            <a:off x="5885632" y="3709050"/>
             <a:ext cx="1915770" cy="1915770"/>
             <a:chOff x="0" y="0"/>
             <a:chExt cx="812800" cy="812800"/>
@@ -9008,7 +9833,7 @@
         </p:grpSpPr>
         <p:sp>
           <p:nvSpPr>
-            <p:cNvPr id="131" name="Google Shape;131;p14"/>
+            <p:cNvPr id="142" name="Google Shape;142;p15"/>
             <p:cNvSpPr/>
             <p:nvPr/>
           </p:nvSpPr>
@@ -9079,7 +9904,421 @@
         </p:sp>
         <p:sp>
           <p:nvSpPr>
-            <p:cNvPr id="132" name="Google Shape;132;p14"/>
+            <p:cNvPr id="143" name="Google Shape;143;p15"/>
+            <p:cNvSpPr txBox="1"/>
+            <p:nvPr/>
+          </p:nvSpPr>
+          <p:spPr>
+            <a:xfrm>
+              <a:off x="76200" y="28575"/>
+              <a:ext cx="660300" cy="708000"/>
+            </a:xfrm>
+            <a:prstGeom prst="rect">
+              <a:avLst/>
+            </a:prstGeom>
+            <a:noFill/>
+            <a:ln>
+              <a:noFill/>
+            </a:ln>
+          </p:spPr>
+          <p:txBody>
+            <a:bodyPr anchorCtr="0" anchor="ctr" bIns="50800" lIns="50800" spcFirstLastPara="1" rIns="50800" wrap="square" tIns="50800">
+              <a:noAutofit/>
+            </a:bodyPr>
+            <a:lstStyle/>
+            <a:p>
+              <a:pPr indent="0" lvl="0" marL="0" marR="0" rtl="0" algn="ctr">
+                <a:lnSpc>
+                  <a:spcPct val="186666"/>
+                </a:lnSpc>
+                <a:spcBef>
+                  <a:spcPts val="0"/>
+                </a:spcBef>
+                <a:spcAft>
+                  <a:spcPts val="0"/>
+                </a:spcAft>
+                <a:buNone/>
+              </a:pPr>
+              <a:r>
+                <a:t/>
+              </a:r>
+              <a:endParaRPr b="0" i="0" sz="1800" u="none" cap="none" strike="noStrike">
+                <a:solidFill>
+                  <a:schemeClr val="dk1"/>
+                </a:solidFill>
+                <a:latin typeface="Calibri"/>
+                <a:ea typeface="Calibri"/>
+                <a:cs typeface="Calibri"/>
+                <a:sym typeface="Calibri"/>
+              </a:endParaRPr>
+            </a:p>
+          </p:txBody>
+        </p:sp>
+      </p:grpSp>
+      <p:grpSp>
+        <p:nvGrpSpPr>
+          <p:cNvPr id="144" name="Google Shape;144;p15"/>
+          <p:cNvGrpSpPr/>
+          <p:nvPr/>
+        </p:nvGrpSpPr>
+        <p:grpSpPr>
+          <a:xfrm>
+            <a:off x="1927205" y="3709050"/>
+            <a:ext cx="1915770" cy="1915770"/>
+            <a:chOff x="0" y="0"/>
+            <a:chExt cx="812800" cy="812800"/>
+          </a:xfrm>
+        </p:grpSpPr>
+        <p:sp>
+          <p:nvSpPr>
+            <p:cNvPr id="145" name="Google Shape;145;p15"/>
+            <p:cNvSpPr/>
+            <p:nvPr/>
+          </p:nvSpPr>
+          <p:spPr>
+            <a:xfrm>
+              <a:off x="0" y="0"/>
+              <a:ext cx="812800" cy="812800"/>
+            </a:xfrm>
+            <a:custGeom>
+              <a:rect b="b" l="l" r="r" t="t"/>
+              <a:pathLst>
+                <a:path extrusionOk="0" h="812800" w="812800">
+                  <a:moveTo>
+                    <a:pt x="406400" y="0"/>
+                  </a:moveTo>
+                  <a:cubicBezTo>
+                    <a:pt x="181951" y="0"/>
+                    <a:pt x="0" y="181951"/>
+                    <a:pt x="0" y="406400"/>
+                  </a:cubicBezTo>
+                  <a:cubicBezTo>
+                    <a:pt x="0" y="630849"/>
+                    <a:pt x="181951" y="812800"/>
+                    <a:pt x="406400" y="812800"/>
+                  </a:cubicBezTo>
+                  <a:cubicBezTo>
+                    <a:pt x="630849" y="812800"/>
+                    <a:pt x="812800" y="630849"/>
+                    <a:pt x="812800" y="406400"/>
+                  </a:cubicBezTo>
+                  <a:cubicBezTo>
+                    <a:pt x="812800" y="181951"/>
+                    <a:pt x="630849" y="0"/>
+                    <a:pt x="406400" y="0"/>
+                  </a:cubicBezTo>
+                  <a:close/>
+                </a:path>
+              </a:pathLst>
+            </a:custGeom>
+            <a:solidFill>
+              <a:srgbClr val="7EB7E8"/>
+            </a:solidFill>
+            <a:ln>
+              <a:noFill/>
+            </a:ln>
+          </p:spPr>
+          <p:txBody>
+            <a:bodyPr anchorCtr="0" anchor="ctr" bIns="91425" lIns="91425" spcFirstLastPara="1" rIns="91425" wrap="square" tIns="91425">
+              <a:noAutofit/>
+            </a:bodyPr>
+            <a:lstStyle/>
+            <a:p>
+              <a:pPr indent="0" lvl="0" marL="0" rtl="0" algn="l">
+                <a:spcBef>
+                  <a:spcPts val="0"/>
+                </a:spcBef>
+                <a:spcAft>
+                  <a:spcPts val="0"/>
+                </a:spcAft>
+                <a:buNone/>
+              </a:pPr>
+              <a:r>
+                <a:t/>
+              </a:r>
+              <a:endParaRPr/>
+            </a:p>
+          </p:txBody>
+        </p:sp>
+        <p:sp>
+          <p:nvSpPr>
+            <p:cNvPr id="146" name="Google Shape;146;p15"/>
+            <p:cNvSpPr txBox="1"/>
+            <p:nvPr/>
+          </p:nvSpPr>
+          <p:spPr>
+            <a:xfrm>
+              <a:off x="76200" y="28575"/>
+              <a:ext cx="660300" cy="708000"/>
+            </a:xfrm>
+            <a:prstGeom prst="rect">
+              <a:avLst/>
+            </a:prstGeom>
+            <a:noFill/>
+            <a:ln>
+              <a:noFill/>
+            </a:ln>
+          </p:spPr>
+          <p:txBody>
+            <a:bodyPr anchorCtr="0" anchor="ctr" bIns="50800" lIns="50800" spcFirstLastPara="1" rIns="50800" wrap="square" tIns="50800">
+              <a:noAutofit/>
+            </a:bodyPr>
+            <a:lstStyle/>
+            <a:p>
+              <a:pPr indent="0" lvl="0" marL="0" marR="0" rtl="0" algn="ctr">
+                <a:lnSpc>
+                  <a:spcPct val="186666"/>
+                </a:lnSpc>
+                <a:spcBef>
+                  <a:spcPts val="0"/>
+                </a:spcBef>
+                <a:spcAft>
+                  <a:spcPts val="0"/>
+                </a:spcAft>
+                <a:buNone/>
+              </a:pPr>
+              <a:r>
+                <a:t/>
+              </a:r>
+              <a:endParaRPr b="0" i="0" sz="1800" u="none" cap="none" strike="noStrike">
+                <a:solidFill>
+                  <a:schemeClr val="dk1"/>
+                </a:solidFill>
+                <a:latin typeface="Calibri"/>
+                <a:ea typeface="Calibri"/>
+                <a:cs typeface="Calibri"/>
+                <a:sym typeface="Calibri"/>
+              </a:endParaRPr>
+            </a:p>
+          </p:txBody>
+        </p:sp>
+      </p:grpSp>
+      <p:grpSp>
+        <p:nvGrpSpPr>
+          <p:cNvPr id="147" name="Google Shape;147;p15"/>
+          <p:cNvGrpSpPr/>
+          <p:nvPr/>
+        </p:nvGrpSpPr>
+        <p:grpSpPr>
+          <a:xfrm>
+            <a:off x="9844059" y="3709050"/>
+            <a:ext cx="1915770" cy="1915770"/>
+            <a:chOff x="0" y="0"/>
+            <a:chExt cx="812800" cy="812800"/>
+          </a:xfrm>
+        </p:grpSpPr>
+        <p:sp>
+          <p:nvSpPr>
+            <p:cNvPr id="148" name="Google Shape;148;p15"/>
+            <p:cNvSpPr/>
+            <p:nvPr/>
+          </p:nvSpPr>
+          <p:spPr>
+            <a:xfrm>
+              <a:off x="0" y="0"/>
+              <a:ext cx="812800" cy="812800"/>
+            </a:xfrm>
+            <a:custGeom>
+              <a:rect b="b" l="l" r="r" t="t"/>
+              <a:pathLst>
+                <a:path extrusionOk="0" h="812800" w="812800">
+                  <a:moveTo>
+                    <a:pt x="406400" y="0"/>
+                  </a:moveTo>
+                  <a:cubicBezTo>
+                    <a:pt x="181951" y="0"/>
+                    <a:pt x="0" y="181951"/>
+                    <a:pt x="0" y="406400"/>
+                  </a:cubicBezTo>
+                  <a:cubicBezTo>
+                    <a:pt x="0" y="630849"/>
+                    <a:pt x="181951" y="812800"/>
+                    <a:pt x="406400" y="812800"/>
+                  </a:cubicBezTo>
+                  <a:cubicBezTo>
+                    <a:pt x="630849" y="812800"/>
+                    <a:pt x="812800" y="630849"/>
+                    <a:pt x="812800" y="406400"/>
+                  </a:cubicBezTo>
+                  <a:cubicBezTo>
+                    <a:pt x="812800" y="181951"/>
+                    <a:pt x="630849" y="0"/>
+                    <a:pt x="406400" y="0"/>
+                  </a:cubicBezTo>
+                  <a:close/>
+                </a:path>
+              </a:pathLst>
+            </a:custGeom>
+            <a:solidFill>
+              <a:srgbClr val="7EB7E8"/>
+            </a:solidFill>
+            <a:ln>
+              <a:noFill/>
+            </a:ln>
+          </p:spPr>
+          <p:txBody>
+            <a:bodyPr anchorCtr="0" anchor="ctr" bIns="91425" lIns="91425" spcFirstLastPara="1" rIns="91425" wrap="square" tIns="91425">
+              <a:noAutofit/>
+            </a:bodyPr>
+            <a:lstStyle/>
+            <a:p>
+              <a:pPr indent="0" lvl="0" marL="0" rtl="0" algn="l">
+                <a:spcBef>
+                  <a:spcPts val="0"/>
+                </a:spcBef>
+                <a:spcAft>
+                  <a:spcPts val="0"/>
+                </a:spcAft>
+                <a:buNone/>
+              </a:pPr>
+              <a:r>
+                <a:t/>
+              </a:r>
+              <a:endParaRPr/>
+            </a:p>
+          </p:txBody>
+        </p:sp>
+        <p:sp>
+          <p:nvSpPr>
+            <p:cNvPr id="149" name="Google Shape;149;p15"/>
+            <p:cNvSpPr txBox="1"/>
+            <p:nvPr/>
+          </p:nvSpPr>
+          <p:spPr>
+            <a:xfrm>
+              <a:off x="76200" y="28575"/>
+              <a:ext cx="660300" cy="708000"/>
+            </a:xfrm>
+            <a:prstGeom prst="rect">
+              <a:avLst/>
+            </a:prstGeom>
+            <a:noFill/>
+            <a:ln>
+              <a:noFill/>
+            </a:ln>
+          </p:spPr>
+          <p:txBody>
+            <a:bodyPr anchorCtr="0" anchor="ctr" bIns="50800" lIns="50800" spcFirstLastPara="1" rIns="50800" wrap="square" tIns="50800">
+              <a:noAutofit/>
+            </a:bodyPr>
+            <a:lstStyle/>
+            <a:p>
+              <a:pPr indent="0" lvl="0" marL="0" marR="0" rtl="0" algn="ctr">
+                <a:lnSpc>
+                  <a:spcPct val="186666"/>
+                </a:lnSpc>
+                <a:spcBef>
+                  <a:spcPts val="0"/>
+                </a:spcBef>
+                <a:spcAft>
+                  <a:spcPts val="0"/>
+                </a:spcAft>
+                <a:buNone/>
+              </a:pPr>
+              <a:r>
+                <a:t/>
+              </a:r>
+              <a:endParaRPr b="0" i="0" sz="1800" u="none" cap="none" strike="noStrike">
+                <a:solidFill>
+                  <a:schemeClr val="dk1"/>
+                </a:solidFill>
+                <a:latin typeface="Calibri"/>
+                <a:ea typeface="Calibri"/>
+                <a:cs typeface="Calibri"/>
+                <a:sym typeface="Calibri"/>
+              </a:endParaRPr>
+            </a:p>
+          </p:txBody>
+        </p:sp>
+      </p:grpSp>
+      <p:grpSp>
+        <p:nvGrpSpPr>
+          <p:cNvPr id="150" name="Google Shape;150;p15"/>
+          <p:cNvGrpSpPr/>
+          <p:nvPr/>
+        </p:nvGrpSpPr>
+        <p:grpSpPr>
+          <a:xfrm>
+            <a:off x="13802486" y="3709050"/>
+            <a:ext cx="1915770" cy="1915770"/>
+            <a:chOff x="0" y="0"/>
+            <a:chExt cx="812800" cy="812800"/>
+          </a:xfrm>
+        </p:grpSpPr>
+        <p:sp>
+          <p:nvSpPr>
+            <p:cNvPr id="151" name="Google Shape;151;p15"/>
+            <p:cNvSpPr/>
+            <p:nvPr/>
+          </p:nvSpPr>
+          <p:spPr>
+            <a:xfrm>
+              <a:off x="0" y="0"/>
+              <a:ext cx="812800" cy="812800"/>
+            </a:xfrm>
+            <a:custGeom>
+              <a:rect b="b" l="l" r="r" t="t"/>
+              <a:pathLst>
+                <a:path extrusionOk="0" h="812800" w="812800">
+                  <a:moveTo>
+                    <a:pt x="406400" y="0"/>
+                  </a:moveTo>
+                  <a:cubicBezTo>
+                    <a:pt x="181951" y="0"/>
+                    <a:pt x="0" y="181951"/>
+                    <a:pt x="0" y="406400"/>
+                  </a:cubicBezTo>
+                  <a:cubicBezTo>
+                    <a:pt x="0" y="630849"/>
+                    <a:pt x="181951" y="812800"/>
+                    <a:pt x="406400" y="812800"/>
+                  </a:cubicBezTo>
+                  <a:cubicBezTo>
+                    <a:pt x="630849" y="812800"/>
+                    <a:pt x="812800" y="630849"/>
+                    <a:pt x="812800" y="406400"/>
+                  </a:cubicBezTo>
+                  <a:cubicBezTo>
+                    <a:pt x="812800" y="181951"/>
+                    <a:pt x="630849" y="0"/>
+                    <a:pt x="406400" y="0"/>
+                  </a:cubicBezTo>
+                  <a:close/>
+                </a:path>
+              </a:pathLst>
+            </a:custGeom>
+            <a:solidFill>
+              <a:srgbClr val="7EB7E8"/>
+            </a:solidFill>
+            <a:ln>
+              <a:noFill/>
+            </a:ln>
+          </p:spPr>
+          <p:txBody>
+            <a:bodyPr anchorCtr="0" anchor="ctr" bIns="91425" lIns="91425" spcFirstLastPara="1" rIns="91425" wrap="square" tIns="91425">
+              <a:noAutofit/>
+            </a:bodyPr>
+            <a:lstStyle/>
+            <a:p>
+              <a:pPr indent="0" lvl="0" marL="0" rtl="0" algn="l">
+                <a:spcBef>
+                  <a:spcPts val="0"/>
+                </a:spcBef>
+                <a:spcAft>
+                  <a:spcPts val="0"/>
+                </a:spcAft>
+                <a:buNone/>
+              </a:pPr>
+              <a:r>
+                <a:t/>
+              </a:r>
+              <a:endParaRPr/>
+            </a:p>
+          </p:txBody>
+        </p:sp>
+        <p:sp>
+          <p:nvSpPr>
+            <p:cNvPr id="152" name="Google Shape;152;p15"/>
             <p:cNvSpPr txBox="1"/>
             <p:nvPr/>
           </p:nvSpPr>
@@ -9132,7 +10371,406 @@
       </p:grpSp>
       <p:pic>
         <p:nvPicPr>
-          <p:cNvPr id="133" name="Google Shape;133;p14"/>
+          <p:cNvPr id="153" name="Google Shape;153;p15"/>
+          <p:cNvPicPr preferRelativeResize="0"/>
+          <p:nvPr/>
+        </p:nvPicPr>
+        <p:blipFill rotWithShape="1">
+          <a:blip r:embed="rId3">
+            <a:alphaModFix/>
+          </a:blip>
+          <a:srcRect b="45298" l="12055" r="80651" t="38706"/>
+          <a:stretch/>
+        </p:blipFill>
+        <p:spPr>
+          <a:xfrm>
+            <a:off x="2280500" y="3842575"/>
+            <a:ext cx="1321400" cy="1630100"/>
+          </a:xfrm>
+          <a:prstGeom prst="rect">
+            <a:avLst/>
+          </a:prstGeom>
+          <a:noFill/>
+          <a:ln>
+            <a:noFill/>
+          </a:ln>
+        </p:spPr>
+      </p:pic>
+      <p:pic>
+        <p:nvPicPr>
+          <p:cNvPr id="154" name="Google Shape;154;p15"/>
+          <p:cNvPicPr preferRelativeResize="0"/>
+          <p:nvPr/>
+        </p:nvPicPr>
+        <p:blipFill rotWithShape="1">
+          <a:blip r:embed="rId3">
+            <a:alphaModFix/>
+          </a:blip>
+          <a:srcRect b="45298" l="34287" r="59509" t="38706"/>
+          <a:stretch/>
+        </p:blipFill>
+        <p:spPr>
+          <a:xfrm>
+            <a:off x="6281700" y="3844700"/>
+            <a:ext cx="1123676" cy="1630100"/>
+          </a:xfrm>
+          <a:prstGeom prst="rect">
+            <a:avLst/>
+          </a:prstGeom>
+          <a:noFill/>
+          <a:ln>
+            <a:noFill/>
+          </a:ln>
+        </p:spPr>
+      </p:pic>
+      <p:pic>
+        <p:nvPicPr>
+          <p:cNvPr id="155" name="Google Shape;155;p15"/>
+          <p:cNvPicPr preferRelativeResize="0"/>
+          <p:nvPr/>
+        </p:nvPicPr>
+        <p:blipFill rotWithShape="1">
+          <a:blip r:embed="rId3">
+            <a:alphaModFix/>
+          </a:blip>
+          <a:srcRect b="45298" l="56470" r="37813" t="38706"/>
+          <a:stretch/>
+        </p:blipFill>
+        <p:spPr>
+          <a:xfrm>
+            <a:off x="10300170" y="3844700"/>
+            <a:ext cx="1035612" cy="1630100"/>
+          </a:xfrm>
+          <a:prstGeom prst="rect">
+            <a:avLst/>
+          </a:prstGeom>
+          <a:noFill/>
+          <a:ln>
+            <a:noFill/>
+          </a:ln>
+        </p:spPr>
+      </p:pic>
+      <p:pic>
+        <p:nvPicPr>
+          <p:cNvPr id="156" name="Google Shape;156;p15"/>
+          <p:cNvPicPr preferRelativeResize="0"/>
+          <p:nvPr/>
+        </p:nvPicPr>
+        <p:blipFill rotWithShape="1">
+          <a:blip r:embed="rId3">
+            <a:alphaModFix/>
+          </a:blip>
+          <a:srcRect b="45298" l="77371" r="15334" t="38706"/>
+          <a:stretch/>
+        </p:blipFill>
+        <p:spPr>
+          <a:xfrm>
+            <a:off x="14162672" y="3844700"/>
+            <a:ext cx="1321400" cy="1630100"/>
+          </a:xfrm>
+          <a:prstGeom prst="rect">
+            <a:avLst/>
+          </a:prstGeom>
+          <a:noFill/>
+          <a:ln>
+            <a:noFill/>
+          </a:ln>
+        </p:spPr>
+      </p:pic>
+      <p:sp>
+        <p:nvSpPr>
+          <p:cNvPr id="157" name="Google Shape;157;p15"/>
+          <p:cNvSpPr txBox="1"/>
+          <p:nvPr/>
+        </p:nvSpPr>
+        <p:spPr>
+          <a:xfrm>
+            <a:off x="1927200" y="8487050"/>
+            <a:ext cx="15868200" cy="554100"/>
+          </a:xfrm>
+          <a:prstGeom prst="rect">
+            <a:avLst/>
+          </a:prstGeom>
+          <a:noFill/>
+          <a:ln>
+            <a:noFill/>
+          </a:ln>
+        </p:spPr>
+        <p:txBody>
+          <a:bodyPr anchorCtr="0" anchor="t" bIns="0" lIns="0" spcFirstLastPara="1" rIns="0" wrap="square" tIns="0">
+            <a:spAutoFit/>
+          </a:bodyPr>
+          <a:lstStyle/>
+          <a:p>
+            <a:pPr indent="0" lvl="0" marL="0" marR="0" rtl="0" algn="l">
+              <a:lnSpc>
+                <a:spcPct val="130000"/>
+              </a:lnSpc>
+              <a:spcBef>
+                <a:spcPts val="0"/>
+              </a:spcBef>
+              <a:spcAft>
+                <a:spcPts val="0"/>
+              </a:spcAft>
+              <a:buNone/>
+            </a:pPr>
+            <a:r>
+              <a:rPr b="1" lang="en-US" sz="3600">
+                <a:latin typeface="Montserrat"/>
+                <a:ea typeface="Montserrat"/>
+                <a:cs typeface="Montserrat"/>
+                <a:sym typeface="Montserrat"/>
+              </a:rPr>
+              <a:t>Repository: </a:t>
+            </a:r>
+            <a:r>
+              <a:rPr lang="en-US" sz="3300" u="sng">
+                <a:solidFill>
+                  <a:schemeClr val="hlink"/>
+                </a:solidFill>
+                <a:latin typeface="Montserrat"/>
+                <a:ea typeface="Montserrat"/>
+                <a:cs typeface="Montserrat"/>
+                <a:sym typeface="Montserrat"/>
+                <a:hlinkClick r:id="rId4"/>
+              </a:rPr>
+              <a:t>https://github.com/EngincanV/SentimentAnalysisDemo</a:t>
+            </a:r>
+            <a:endParaRPr sz="1200"/>
+          </a:p>
+        </p:txBody>
+      </p:sp>
+    </p:spTree>
+  </p:cSld>
+  <p:clrMapOvr>
+    <a:masterClrMapping/>
+  </p:clrMapOvr>
+</p:sld>
+</file>
+
+<file path=ppt/slides/slide8.xml><?xml version="1.0" encoding="utf-8"?>
+<p:sld xmlns:a="http://schemas.openxmlformats.org/drawingml/2006/main" xmlns:r="http://schemas.openxmlformats.org/officeDocument/2006/relationships" xmlns:mc="http://schemas.openxmlformats.org/markup-compatibility/2006" xmlns:mv="urn:schemas-microsoft-com:mac:vml" xmlns:p="http://schemas.openxmlformats.org/presentationml/2006/main" xmlns:c="http://schemas.openxmlformats.org/drawingml/2006/chart" xmlns:dgm="http://schemas.openxmlformats.org/drawingml/2006/diagram" xmlns:o="urn:schemas-microsoft-com:office:office" xmlns:v="urn:schemas-microsoft-com:vml" xmlns:pvml="urn:schemas-microsoft-com:office:powerpoint" xmlns:com="http://schemas.openxmlformats.org/drawingml/2006/compatibility" xmlns:p14="http://schemas.microsoft.com/office/powerpoint/2010/main" xmlns:p15="http://schemas.microsoft.com/office/powerpoint/2012/main" xmlns:ahyp="http://schemas.microsoft.com/office/drawing/2018/hyperlinkcolor">
+  <p:cSld>
+    <p:bg>
+      <p:bgPr>
+        <a:gradFill>
+          <a:gsLst>
+            <a:gs pos="0">
+              <a:srgbClr val="CDFFD8"/>
+            </a:gs>
+            <a:gs pos="100000">
+              <a:srgbClr val="94B9FF"/>
+            </a:gs>
+          </a:gsLst>
+          <a:lin ang="5400012" scaled="0"/>
+        </a:gradFill>
+      </p:bgPr>
+    </p:bg>
+    <p:spTree>
+      <p:nvGrpSpPr>
+        <p:cNvPr id="161" name="Shape 161"/>
+        <p:cNvGrpSpPr/>
+        <p:nvPr/>
+      </p:nvGrpSpPr>
+      <p:grpSpPr>
+        <a:xfrm>
+          <a:off x="0" y="0"/>
+          <a:ext cx="0" cy="0"/>
+          <a:chOff x="0" y="0"/>
+          <a:chExt cx="0" cy="0"/>
+        </a:xfrm>
+      </p:grpSpPr>
+      <p:sp>
+        <p:nvSpPr>
+          <p:cNvPr id="162" name="Google Shape;162;p16"/>
+          <p:cNvSpPr txBox="1"/>
+          <p:nvPr/>
+        </p:nvSpPr>
+        <p:spPr>
+          <a:xfrm>
+            <a:off x="1216551" y="6503850"/>
+            <a:ext cx="3355500" cy="400200"/>
+          </a:xfrm>
+          <a:prstGeom prst="rect">
+            <a:avLst/>
+          </a:prstGeom>
+          <a:noFill/>
+          <a:ln>
+            <a:noFill/>
+          </a:ln>
+        </p:spPr>
+        <p:txBody>
+          <a:bodyPr anchorCtr="0" anchor="t" bIns="0" lIns="0" spcFirstLastPara="1" rIns="0" wrap="square" tIns="0">
+            <a:spAutoFit/>
+          </a:bodyPr>
+          <a:lstStyle/>
+          <a:p>
+            <a:pPr indent="0" lvl="0" marL="0" marR="0" rtl="0" algn="ctr">
+              <a:lnSpc>
+                <a:spcPct val="120000"/>
+              </a:lnSpc>
+              <a:spcBef>
+                <a:spcPts val="0"/>
+              </a:spcBef>
+              <a:spcAft>
+                <a:spcPts val="0"/>
+              </a:spcAft>
+              <a:buNone/>
+            </a:pPr>
+            <a:r>
+              <a:rPr b="1" lang="en-US" sz="2600">
+                <a:latin typeface="Montserrat"/>
+                <a:ea typeface="Montserrat"/>
+                <a:cs typeface="Montserrat"/>
+                <a:sym typeface="Montserrat"/>
+              </a:rPr>
+              <a:t>Comment</a:t>
+            </a:r>
+            <a:endParaRPr/>
+          </a:p>
+        </p:txBody>
+      </p:sp>
+      <p:grpSp>
+        <p:nvGrpSpPr>
+          <p:cNvPr id="163" name="Google Shape;163;p16"/>
+          <p:cNvGrpSpPr/>
+          <p:nvPr/>
+        </p:nvGrpSpPr>
+        <p:grpSpPr>
+          <a:xfrm>
+            <a:off x="1927205" y="4318650"/>
+            <a:ext cx="1915770" cy="1915770"/>
+            <a:chOff x="0" y="0"/>
+            <a:chExt cx="812800" cy="812800"/>
+          </a:xfrm>
+        </p:grpSpPr>
+        <p:sp>
+          <p:nvSpPr>
+            <p:cNvPr id="164" name="Google Shape;164;p16"/>
+            <p:cNvSpPr/>
+            <p:nvPr/>
+          </p:nvSpPr>
+          <p:spPr>
+            <a:xfrm>
+              <a:off x="0" y="0"/>
+              <a:ext cx="812800" cy="812800"/>
+            </a:xfrm>
+            <a:custGeom>
+              <a:rect b="b" l="l" r="r" t="t"/>
+              <a:pathLst>
+                <a:path extrusionOk="0" h="812800" w="812800">
+                  <a:moveTo>
+                    <a:pt x="406400" y="0"/>
+                  </a:moveTo>
+                  <a:cubicBezTo>
+                    <a:pt x="181951" y="0"/>
+                    <a:pt x="0" y="181951"/>
+                    <a:pt x="0" y="406400"/>
+                  </a:cubicBezTo>
+                  <a:cubicBezTo>
+                    <a:pt x="0" y="630849"/>
+                    <a:pt x="181951" y="812800"/>
+                    <a:pt x="406400" y="812800"/>
+                  </a:cubicBezTo>
+                  <a:cubicBezTo>
+                    <a:pt x="630849" y="812800"/>
+                    <a:pt x="812800" y="630849"/>
+                    <a:pt x="812800" y="406400"/>
+                  </a:cubicBezTo>
+                  <a:cubicBezTo>
+                    <a:pt x="812800" y="181951"/>
+                    <a:pt x="630849" y="0"/>
+                    <a:pt x="406400" y="0"/>
+                  </a:cubicBezTo>
+                  <a:close/>
+                </a:path>
+              </a:pathLst>
+            </a:custGeom>
+            <a:solidFill>
+              <a:srgbClr val="7EB7E8"/>
+            </a:solidFill>
+            <a:ln>
+              <a:noFill/>
+            </a:ln>
+          </p:spPr>
+          <p:txBody>
+            <a:bodyPr anchorCtr="0" anchor="ctr" bIns="91425" lIns="91425" spcFirstLastPara="1" rIns="91425" wrap="square" tIns="91425">
+              <a:noAutofit/>
+            </a:bodyPr>
+            <a:lstStyle/>
+            <a:p>
+              <a:pPr indent="0" lvl="0" marL="0" rtl="0" algn="l">
+                <a:spcBef>
+                  <a:spcPts val="0"/>
+                </a:spcBef>
+                <a:spcAft>
+                  <a:spcPts val="0"/>
+                </a:spcAft>
+                <a:buNone/>
+              </a:pPr>
+              <a:r>
+                <a:t/>
+              </a:r>
+              <a:endParaRPr/>
+            </a:p>
+          </p:txBody>
+        </p:sp>
+        <p:sp>
+          <p:nvSpPr>
+            <p:cNvPr id="165" name="Google Shape;165;p16"/>
+            <p:cNvSpPr txBox="1"/>
+            <p:nvPr/>
+          </p:nvSpPr>
+          <p:spPr>
+            <a:xfrm>
+              <a:off x="76200" y="28575"/>
+              <a:ext cx="660300" cy="708000"/>
+            </a:xfrm>
+            <a:prstGeom prst="rect">
+              <a:avLst/>
+            </a:prstGeom>
+            <a:noFill/>
+            <a:ln>
+              <a:noFill/>
+            </a:ln>
+          </p:spPr>
+          <p:txBody>
+            <a:bodyPr anchorCtr="0" anchor="ctr" bIns="50800" lIns="50800" spcFirstLastPara="1" rIns="50800" wrap="square" tIns="50800">
+              <a:noAutofit/>
+            </a:bodyPr>
+            <a:lstStyle/>
+            <a:p>
+              <a:pPr indent="0" lvl="0" marL="0" marR="0" rtl="0" algn="ctr">
+                <a:lnSpc>
+                  <a:spcPct val="186666"/>
+                </a:lnSpc>
+                <a:spcBef>
+                  <a:spcPts val="0"/>
+                </a:spcBef>
+                <a:spcAft>
+                  <a:spcPts val="0"/>
+                </a:spcAft>
+                <a:buNone/>
+              </a:pPr>
+              <a:r>
+                <a:t/>
+              </a:r>
+              <a:endParaRPr b="0" i="0" sz="1800" u="none" cap="none" strike="noStrike">
+                <a:solidFill>
+                  <a:schemeClr val="dk1"/>
+                </a:solidFill>
+                <a:latin typeface="Calibri"/>
+                <a:ea typeface="Calibri"/>
+                <a:cs typeface="Calibri"/>
+                <a:sym typeface="Calibri"/>
+              </a:endParaRPr>
+            </a:p>
+          </p:txBody>
+        </p:sp>
+      </p:grpSp>
+      <p:pic>
+        <p:nvPicPr>
+          <p:cNvPr id="166" name="Google Shape;166;p16"/>
           <p:cNvPicPr preferRelativeResize="0"/>
           <p:nvPr/>
         </p:nvPicPr>
@@ -9159,7 +10797,7 @@
       </p:pic>
       <p:pic>
         <p:nvPicPr>
-          <p:cNvPr id="134" name="Google Shape;134;p14"/>
+          <p:cNvPr id="167" name="Google Shape;167;p16"/>
           <p:cNvPicPr preferRelativeResize="0"/>
           <p:nvPr/>
         </p:nvPicPr>
@@ -9187,7 +10825,7 @@
       </p:pic>
       <p:grpSp>
         <p:nvGrpSpPr>
-          <p:cNvPr id="135" name="Google Shape;135;p14"/>
+          <p:cNvPr id="168" name="Google Shape;168;p16"/>
           <p:cNvGrpSpPr/>
           <p:nvPr/>
         </p:nvGrpSpPr>
@@ -9201,7 +10839,7 @@
         </p:grpSpPr>
         <p:sp>
           <p:nvSpPr>
-            <p:cNvPr id="136" name="Google Shape;136;p14"/>
+            <p:cNvPr id="169" name="Google Shape;169;p16"/>
             <p:cNvSpPr txBox="1"/>
             <p:nvPr/>
           </p:nvSpPr>
@@ -9288,7 +10926,7 @@
               </a:pPr>
               <a:r>
                 <a:rPr lang="en-US" sz="2400"/>
-                <a:t>Data transformations and choosing the correct algorithm</a:t>
+                <a:t>Data transformations (transforming to numeric vectors) and choosing the correct algorithm</a:t>
               </a:r>
               <a:endParaRPr sz="2400"/>
             </a:p>
@@ -9336,7 +10974,7 @@
         </p:sp>
         <p:sp>
           <p:nvSpPr>
-            <p:cNvPr id="137" name="Google Shape;137;p14"/>
+            <p:cNvPr id="170" name="Google Shape;170;p16"/>
             <p:cNvSpPr txBox="1"/>
             <p:nvPr/>
           </p:nvSpPr>
@@ -9393,7 +11031,7 @@
 </p:sld>
 </file>
 
-<file path=ppt/slides/slide7.xml><?xml version="1.0" encoding="utf-8"?>
+<file path=ppt/slides/slide9.xml><?xml version="1.0" encoding="utf-8"?>
 <p:sld xmlns:a="http://schemas.openxmlformats.org/drawingml/2006/main" xmlns:r="http://schemas.openxmlformats.org/officeDocument/2006/relationships" xmlns:mc="http://schemas.openxmlformats.org/markup-compatibility/2006" xmlns:mv="urn:schemas-microsoft-com:mac:vml" xmlns:p="http://schemas.openxmlformats.org/presentationml/2006/main" xmlns:c="http://schemas.openxmlformats.org/drawingml/2006/chart" xmlns:dgm="http://schemas.openxmlformats.org/drawingml/2006/diagram" xmlns:o="urn:schemas-microsoft-com:office:office" xmlns:v="urn:schemas-microsoft-com:vml" xmlns:pvml="urn:schemas-microsoft-com:office:powerpoint" xmlns:com="http://schemas.openxmlformats.org/drawingml/2006/compatibility" xmlns:p14="http://schemas.microsoft.com/office/powerpoint/2010/main" xmlns:p15="http://schemas.microsoft.com/office/powerpoint/2012/main" xmlns:ahyp="http://schemas.microsoft.com/office/drawing/2018/hyperlinkcolor">
   <p:cSld>
     <p:bg>
@@ -9413,1029 +11051,7 @@
     </p:bg>
     <p:spTree>
       <p:nvGrpSpPr>
-        <p:cNvPr id="141" name="Shape 141"/>
-        <p:cNvGrpSpPr/>
-        <p:nvPr/>
-      </p:nvGrpSpPr>
-      <p:grpSpPr>
-        <a:xfrm>
-          <a:off x="0" y="0"/>
-          <a:ext cx="0" cy="0"/>
-          <a:chOff x="0" y="0"/>
-          <a:chExt cx="0" cy="0"/>
-        </a:xfrm>
-      </p:grpSpPr>
-      <p:sp>
-        <p:nvSpPr>
-          <p:cNvPr id="142" name="Google Shape;142;p15"/>
-          <p:cNvSpPr txBox="1"/>
-          <p:nvPr/>
-        </p:nvSpPr>
-        <p:spPr>
-          <a:xfrm>
-            <a:off x="1028700" y="1009650"/>
-            <a:ext cx="16230600" cy="2133300"/>
-          </a:xfrm>
-          <a:prstGeom prst="rect">
-            <a:avLst/>
-          </a:prstGeom>
-          <a:noFill/>
-          <a:ln>
-            <a:noFill/>
-          </a:ln>
-        </p:spPr>
-        <p:txBody>
-          <a:bodyPr anchorCtr="0" anchor="t" bIns="0" lIns="0" spcFirstLastPara="1" rIns="0" wrap="square" tIns="0">
-            <a:spAutoFit/>
-          </a:bodyPr>
-          <a:lstStyle/>
-          <a:p>
-            <a:pPr indent="0" lvl="0" marL="0" marR="0" rtl="0" algn="ctr">
-              <a:lnSpc>
-                <a:spcPct val="120000"/>
-              </a:lnSpc>
-              <a:spcBef>
-                <a:spcPts val="0"/>
-              </a:spcBef>
-              <a:spcAft>
-                <a:spcPts val="0"/>
-              </a:spcAft>
-              <a:buNone/>
-            </a:pPr>
-            <a:r>
-              <a:rPr lang="en-US" sz="6300">
-                <a:solidFill>
-                  <a:srgbClr val="1557FF"/>
-                </a:solidFill>
-                <a:latin typeface="Archivo Black"/>
-                <a:ea typeface="Archivo Black"/>
-                <a:cs typeface="Archivo Black"/>
-                <a:sym typeface="Archivo Black"/>
-              </a:rPr>
-              <a:t>Demo: Applying Sentiment Analysis to CMS Kit’s Commenting Feature</a:t>
-            </a:r>
-            <a:endParaRPr sz="200"/>
-          </a:p>
-        </p:txBody>
-      </p:sp>
-      <p:sp>
-        <p:nvSpPr>
-          <p:cNvPr id="143" name="Google Shape;143;p15"/>
-          <p:cNvSpPr txBox="1"/>
-          <p:nvPr/>
-        </p:nvSpPr>
-        <p:spPr>
-          <a:xfrm>
-            <a:off x="1216551" y="6503850"/>
-            <a:ext cx="3355500" cy="400200"/>
-          </a:xfrm>
-          <a:prstGeom prst="rect">
-            <a:avLst/>
-          </a:prstGeom>
-          <a:noFill/>
-          <a:ln>
-            <a:noFill/>
-          </a:ln>
-        </p:spPr>
-        <p:txBody>
-          <a:bodyPr anchorCtr="0" anchor="t" bIns="0" lIns="0" spcFirstLastPara="1" rIns="0" wrap="square" tIns="0">
-            <a:spAutoFit/>
-          </a:bodyPr>
-          <a:lstStyle/>
-          <a:p>
-            <a:pPr indent="0" lvl="0" marL="0" marR="0" rtl="0" algn="ctr">
-              <a:lnSpc>
-                <a:spcPct val="120000"/>
-              </a:lnSpc>
-              <a:spcBef>
-                <a:spcPts val="0"/>
-              </a:spcBef>
-              <a:spcAft>
-                <a:spcPts val="0"/>
-              </a:spcAft>
-              <a:buNone/>
-            </a:pPr>
-            <a:r>
-              <a:rPr b="1" lang="en-US" sz="2600">
-                <a:latin typeface="Montserrat"/>
-                <a:ea typeface="Montserrat"/>
-                <a:cs typeface="Montserrat"/>
-                <a:sym typeface="Montserrat"/>
-              </a:rPr>
-              <a:t>Comment</a:t>
-            </a:r>
-            <a:endParaRPr/>
-          </a:p>
-        </p:txBody>
-      </p:sp>
-      <p:cxnSp>
-        <p:nvCxnSpPr>
-          <p:cNvPr id="144" name="Google Shape;144;p15"/>
-          <p:cNvCxnSpPr/>
-          <p:nvPr/>
-        </p:nvCxnSpPr>
-        <p:spPr>
-          <a:xfrm>
-            <a:off x="1028700" y="5217294"/>
-            <a:ext cx="15868200" cy="0"/>
-          </a:xfrm>
-          <a:prstGeom prst="straightConnector1">
-            <a:avLst/>
-          </a:prstGeom>
-          <a:noFill/>
-          <a:ln cap="flat" cmpd="sng" w="47625">
-            <a:solidFill>
-              <a:srgbClr val="4F7DCF"/>
-            </a:solidFill>
-            <a:prstDash val="solid"/>
-            <a:round/>
-            <a:headEnd len="sm" w="sm" type="none"/>
-            <a:tailEnd len="sm" w="sm" type="none"/>
-          </a:ln>
-        </p:spPr>
-      </p:cxnSp>
-      <p:sp>
-        <p:nvSpPr>
-          <p:cNvPr id="145" name="Google Shape;145;p15"/>
-          <p:cNvSpPr txBox="1"/>
-          <p:nvPr/>
-        </p:nvSpPr>
-        <p:spPr>
-          <a:xfrm>
-            <a:off x="5089448" y="6503838"/>
-            <a:ext cx="3690000" cy="880500"/>
-          </a:xfrm>
-          <a:prstGeom prst="rect">
-            <a:avLst/>
-          </a:prstGeom>
-          <a:noFill/>
-          <a:ln>
-            <a:noFill/>
-          </a:ln>
-        </p:spPr>
-        <p:txBody>
-          <a:bodyPr anchorCtr="0" anchor="t" bIns="0" lIns="0" spcFirstLastPara="1" rIns="0" wrap="square" tIns="0">
-            <a:spAutoFit/>
-          </a:bodyPr>
-          <a:lstStyle/>
-          <a:p>
-            <a:pPr indent="0" lvl="0" marL="0" marR="0" rtl="0" algn="ctr">
-              <a:lnSpc>
-                <a:spcPct val="120000"/>
-              </a:lnSpc>
-              <a:spcBef>
-                <a:spcPts val="0"/>
-              </a:spcBef>
-              <a:spcAft>
-                <a:spcPts val="0"/>
-              </a:spcAft>
-              <a:buNone/>
-            </a:pPr>
-            <a:r>
-              <a:rPr b="1" lang="en-US" sz="2600">
-                <a:latin typeface="Montserrat"/>
-                <a:ea typeface="Montserrat"/>
-                <a:cs typeface="Montserrat"/>
-                <a:sym typeface="Montserrat"/>
-              </a:rPr>
-              <a:t>Sentiment Analysis</a:t>
-            </a:r>
-            <a:endParaRPr b="1" sz="2600">
-              <a:latin typeface="Montserrat"/>
-              <a:ea typeface="Montserrat"/>
-              <a:cs typeface="Montserrat"/>
-              <a:sym typeface="Montserrat"/>
-            </a:endParaRPr>
-          </a:p>
-          <a:p>
-            <a:pPr indent="0" lvl="0" marL="0" marR="0" rtl="0" algn="ctr">
-              <a:lnSpc>
-                <a:spcPct val="120000"/>
-              </a:lnSpc>
-              <a:spcBef>
-                <a:spcPts val="0"/>
-              </a:spcBef>
-              <a:spcAft>
-                <a:spcPts val="0"/>
-              </a:spcAft>
-              <a:buNone/>
-            </a:pPr>
-            <a:r>
-              <a:rPr b="1" lang="en-US" sz="2600">
-                <a:latin typeface="Montserrat"/>
-                <a:ea typeface="Montserrat"/>
-                <a:cs typeface="Montserrat"/>
-                <a:sym typeface="Montserrat"/>
-              </a:rPr>
-              <a:t>(Spam Detection)</a:t>
-            </a:r>
-            <a:endParaRPr b="1" sz="2600">
-              <a:latin typeface="Montserrat"/>
-              <a:ea typeface="Montserrat"/>
-              <a:cs typeface="Montserrat"/>
-              <a:sym typeface="Montserrat"/>
-            </a:endParaRPr>
-          </a:p>
-        </p:txBody>
-      </p:sp>
-      <p:sp>
-        <p:nvSpPr>
-          <p:cNvPr id="146" name="Google Shape;146;p15"/>
-          <p:cNvSpPr txBox="1"/>
-          <p:nvPr/>
-        </p:nvSpPr>
-        <p:spPr>
-          <a:xfrm>
-            <a:off x="9296849" y="6503888"/>
-            <a:ext cx="3355500" cy="400200"/>
-          </a:xfrm>
-          <a:prstGeom prst="rect">
-            <a:avLst/>
-          </a:prstGeom>
-          <a:noFill/>
-          <a:ln>
-            <a:noFill/>
-          </a:ln>
-        </p:spPr>
-        <p:txBody>
-          <a:bodyPr anchorCtr="0" anchor="t" bIns="0" lIns="0" spcFirstLastPara="1" rIns="0" wrap="square" tIns="0">
-            <a:spAutoFit/>
-          </a:bodyPr>
-          <a:lstStyle/>
-          <a:p>
-            <a:pPr indent="0" lvl="0" marL="0" marR="0" rtl="0" algn="ctr">
-              <a:lnSpc>
-                <a:spcPct val="120000"/>
-              </a:lnSpc>
-              <a:spcBef>
-                <a:spcPts val="0"/>
-              </a:spcBef>
-              <a:spcAft>
-                <a:spcPts val="0"/>
-              </a:spcAft>
-              <a:buNone/>
-            </a:pPr>
-            <a:r>
-              <a:rPr b="1" lang="en-US" sz="2600">
-                <a:latin typeface="Montserrat"/>
-                <a:ea typeface="Montserrat"/>
-                <a:cs typeface="Montserrat"/>
-                <a:sym typeface="Montserrat"/>
-              </a:rPr>
-              <a:t>Evaluate</a:t>
-            </a:r>
-            <a:r>
-              <a:rPr b="1" lang="en-US" sz="2600">
-                <a:latin typeface="Montserrat"/>
-                <a:ea typeface="Montserrat"/>
-                <a:cs typeface="Montserrat"/>
-                <a:sym typeface="Montserrat"/>
-              </a:rPr>
-              <a:t> Results</a:t>
-            </a:r>
-            <a:endParaRPr/>
-          </a:p>
-        </p:txBody>
-      </p:sp>
-      <p:sp>
-        <p:nvSpPr>
-          <p:cNvPr id="147" name="Google Shape;147;p15"/>
-          <p:cNvSpPr txBox="1"/>
-          <p:nvPr/>
-        </p:nvSpPr>
-        <p:spPr>
-          <a:xfrm>
-            <a:off x="13175625" y="6471113"/>
-            <a:ext cx="3594600" cy="880500"/>
-          </a:xfrm>
-          <a:prstGeom prst="rect">
-            <a:avLst/>
-          </a:prstGeom>
-          <a:noFill/>
-          <a:ln>
-            <a:noFill/>
-          </a:ln>
-        </p:spPr>
-        <p:txBody>
-          <a:bodyPr anchorCtr="0" anchor="t" bIns="0" lIns="0" spcFirstLastPara="1" rIns="0" wrap="square" tIns="0">
-            <a:spAutoFit/>
-          </a:bodyPr>
-          <a:lstStyle/>
-          <a:p>
-            <a:pPr indent="0" lvl="0" marL="0" marR="0" rtl="0" algn="ctr">
-              <a:lnSpc>
-                <a:spcPct val="120000"/>
-              </a:lnSpc>
-              <a:spcBef>
-                <a:spcPts val="0"/>
-              </a:spcBef>
-              <a:spcAft>
-                <a:spcPts val="0"/>
-              </a:spcAft>
-              <a:buNone/>
-            </a:pPr>
-            <a:r>
-              <a:rPr b="1" lang="en-US" sz="2600">
-                <a:latin typeface="Montserrat"/>
-                <a:ea typeface="Montserrat"/>
-                <a:cs typeface="Montserrat"/>
-                <a:sym typeface="Montserrat"/>
-              </a:rPr>
-              <a:t>Approve or Reject the Comment</a:t>
-            </a:r>
-            <a:endParaRPr/>
-          </a:p>
-        </p:txBody>
-      </p:sp>
-      <p:grpSp>
-        <p:nvGrpSpPr>
-          <p:cNvPr id="148" name="Google Shape;148;p15"/>
-          <p:cNvGrpSpPr/>
-          <p:nvPr/>
-        </p:nvGrpSpPr>
-        <p:grpSpPr>
-          <a:xfrm>
-            <a:off x="5885632" y="4318650"/>
-            <a:ext cx="1915770" cy="1915770"/>
-            <a:chOff x="0" y="0"/>
-            <a:chExt cx="812800" cy="812800"/>
-          </a:xfrm>
-        </p:grpSpPr>
-        <p:sp>
-          <p:nvSpPr>
-            <p:cNvPr id="149" name="Google Shape;149;p15"/>
-            <p:cNvSpPr/>
-            <p:nvPr/>
-          </p:nvSpPr>
-          <p:spPr>
-            <a:xfrm>
-              <a:off x="0" y="0"/>
-              <a:ext cx="812800" cy="812800"/>
-            </a:xfrm>
-            <a:custGeom>
-              <a:rect b="b" l="l" r="r" t="t"/>
-              <a:pathLst>
-                <a:path extrusionOk="0" h="812800" w="812800">
-                  <a:moveTo>
-                    <a:pt x="406400" y="0"/>
-                  </a:moveTo>
-                  <a:cubicBezTo>
-                    <a:pt x="181951" y="0"/>
-                    <a:pt x="0" y="181951"/>
-                    <a:pt x="0" y="406400"/>
-                  </a:cubicBezTo>
-                  <a:cubicBezTo>
-                    <a:pt x="0" y="630849"/>
-                    <a:pt x="181951" y="812800"/>
-                    <a:pt x="406400" y="812800"/>
-                  </a:cubicBezTo>
-                  <a:cubicBezTo>
-                    <a:pt x="630849" y="812800"/>
-                    <a:pt x="812800" y="630849"/>
-                    <a:pt x="812800" y="406400"/>
-                  </a:cubicBezTo>
-                  <a:cubicBezTo>
-                    <a:pt x="812800" y="181951"/>
-                    <a:pt x="630849" y="0"/>
-                    <a:pt x="406400" y="0"/>
-                  </a:cubicBezTo>
-                  <a:close/>
-                </a:path>
-              </a:pathLst>
-            </a:custGeom>
-            <a:solidFill>
-              <a:srgbClr val="7EB7E8"/>
-            </a:solidFill>
-            <a:ln>
-              <a:noFill/>
-            </a:ln>
-          </p:spPr>
-          <p:txBody>
-            <a:bodyPr anchorCtr="0" anchor="ctr" bIns="91425" lIns="91425" spcFirstLastPara="1" rIns="91425" wrap="square" tIns="91425">
-              <a:noAutofit/>
-            </a:bodyPr>
-            <a:lstStyle/>
-            <a:p>
-              <a:pPr indent="0" lvl="0" marL="0" rtl="0" algn="l">
-                <a:spcBef>
-                  <a:spcPts val="0"/>
-                </a:spcBef>
-                <a:spcAft>
-                  <a:spcPts val="0"/>
-                </a:spcAft>
-                <a:buNone/>
-              </a:pPr>
-              <a:r>
-                <a:t/>
-              </a:r>
-              <a:endParaRPr/>
-            </a:p>
-          </p:txBody>
-        </p:sp>
-        <p:sp>
-          <p:nvSpPr>
-            <p:cNvPr id="150" name="Google Shape;150;p15"/>
-            <p:cNvSpPr txBox="1"/>
-            <p:nvPr/>
-          </p:nvSpPr>
-          <p:spPr>
-            <a:xfrm>
-              <a:off x="76200" y="28575"/>
-              <a:ext cx="660400" cy="708025"/>
-            </a:xfrm>
-            <a:prstGeom prst="rect">
-              <a:avLst/>
-            </a:prstGeom>
-            <a:noFill/>
-            <a:ln>
-              <a:noFill/>
-            </a:ln>
-          </p:spPr>
-          <p:txBody>
-            <a:bodyPr anchorCtr="0" anchor="ctr" bIns="50800" lIns="50800" spcFirstLastPara="1" rIns="50800" wrap="square" tIns="50800">
-              <a:noAutofit/>
-            </a:bodyPr>
-            <a:lstStyle/>
-            <a:p>
-              <a:pPr indent="0" lvl="0" marL="0" marR="0" rtl="0" algn="ctr">
-                <a:lnSpc>
-                  <a:spcPct val="186666"/>
-                </a:lnSpc>
-                <a:spcBef>
-                  <a:spcPts val="0"/>
-                </a:spcBef>
-                <a:spcAft>
-                  <a:spcPts val="0"/>
-                </a:spcAft>
-                <a:buNone/>
-              </a:pPr>
-              <a:r>
-                <a:t/>
-              </a:r>
-              <a:endParaRPr b="0" i="0" sz="1800" u="none" cap="none" strike="noStrike">
-                <a:solidFill>
-                  <a:schemeClr val="dk1"/>
-                </a:solidFill>
-                <a:latin typeface="Calibri"/>
-                <a:ea typeface="Calibri"/>
-                <a:cs typeface="Calibri"/>
-                <a:sym typeface="Calibri"/>
-              </a:endParaRPr>
-            </a:p>
-          </p:txBody>
-        </p:sp>
-      </p:grpSp>
-      <p:grpSp>
-        <p:nvGrpSpPr>
-          <p:cNvPr id="151" name="Google Shape;151;p15"/>
-          <p:cNvGrpSpPr/>
-          <p:nvPr/>
-        </p:nvGrpSpPr>
-        <p:grpSpPr>
-          <a:xfrm>
-            <a:off x="1927205" y="4318650"/>
-            <a:ext cx="1915770" cy="1915770"/>
-            <a:chOff x="0" y="0"/>
-            <a:chExt cx="812800" cy="812800"/>
-          </a:xfrm>
-        </p:grpSpPr>
-        <p:sp>
-          <p:nvSpPr>
-            <p:cNvPr id="152" name="Google Shape;152;p15"/>
-            <p:cNvSpPr/>
-            <p:nvPr/>
-          </p:nvSpPr>
-          <p:spPr>
-            <a:xfrm>
-              <a:off x="0" y="0"/>
-              <a:ext cx="812800" cy="812800"/>
-            </a:xfrm>
-            <a:custGeom>
-              <a:rect b="b" l="l" r="r" t="t"/>
-              <a:pathLst>
-                <a:path extrusionOk="0" h="812800" w="812800">
-                  <a:moveTo>
-                    <a:pt x="406400" y="0"/>
-                  </a:moveTo>
-                  <a:cubicBezTo>
-                    <a:pt x="181951" y="0"/>
-                    <a:pt x="0" y="181951"/>
-                    <a:pt x="0" y="406400"/>
-                  </a:cubicBezTo>
-                  <a:cubicBezTo>
-                    <a:pt x="0" y="630849"/>
-                    <a:pt x="181951" y="812800"/>
-                    <a:pt x="406400" y="812800"/>
-                  </a:cubicBezTo>
-                  <a:cubicBezTo>
-                    <a:pt x="630849" y="812800"/>
-                    <a:pt x="812800" y="630849"/>
-                    <a:pt x="812800" y="406400"/>
-                  </a:cubicBezTo>
-                  <a:cubicBezTo>
-                    <a:pt x="812800" y="181951"/>
-                    <a:pt x="630849" y="0"/>
-                    <a:pt x="406400" y="0"/>
-                  </a:cubicBezTo>
-                  <a:close/>
-                </a:path>
-              </a:pathLst>
-            </a:custGeom>
-            <a:solidFill>
-              <a:srgbClr val="7EB7E8"/>
-            </a:solidFill>
-            <a:ln>
-              <a:noFill/>
-            </a:ln>
-          </p:spPr>
-          <p:txBody>
-            <a:bodyPr anchorCtr="0" anchor="ctr" bIns="91425" lIns="91425" spcFirstLastPara="1" rIns="91425" wrap="square" tIns="91425">
-              <a:noAutofit/>
-            </a:bodyPr>
-            <a:lstStyle/>
-            <a:p>
-              <a:pPr indent="0" lvl="0" marL="0" rtl="0" algn="l">
-                <a:spcBef>
-                  <a:spcPts val="0"/>
-                </a:spcBef>
-                <a:spcAft>
-                  <a:spcPts val="0"/>
-                </a:spcAft>
-                <a:buNone/>
-              </a:pPr>
-              <a:r>
-                <a:t/>
-              </a:r>
-              <a:endParaRPr/>
-            </a:p>
-          </p:txBody>
-        </p:sp>
-        <p:sp>
-          <p:nvSpPr>
-            <p:cNvPr id="153" name="Google Shape;153;p15"/>
-            <p:cNvSpPr txBox="1"/>
-            <p:nvPr/>
-          </p:nvSpPr>
-          <p:spPr>
-            <a:xfrm>
-              <a:off x="76200" y="28575"/>
-              <a:ext cx="660400" cy="708025"/>
-            </a:xfrm>
-            <a:prstGeom prst="rect">
-              <a:avLst/>
-            </a:prstGeom>
-            <a:noFill/>
-            <a:ln>
-              <a:noFill/>
-            </a:ln>
-          </p:spPr>
-          <p:txBody>
-            <a:bodyPr anchorCtr="0" anchor="ctr" bIns="50800" lIns="50800" spcFirstLastPara="1" rIns="50800" wrap="square" tIns="50800">
-              <a:noAutofit/>
-            </a:bodyPr>
-            <a:lstStyle/>
-            <a:p>
-              <a:pPr indent="0" lvl="0" marL="0" marR="0" rtl="0" algn="ctr">
-                <a:lnSpc>
-                  <a:spcPct val="186666"/>
-                </a:lnSpc>
-                <a:spcBef>
-                  <a:spcPts val="0"/>
-                </a:spcBef>
-                <a:spcAft>
-                  <a:spcPts val="0"/>
-                </a:spcAft>
-                <a:buNone/>
-              </a:pPr>
-              <a:r>
-                <a:t/>
-              </a:r>
-              <a:endParaRPr b="0" i="0" sz="1800" u="none" cap="none" strike="noStrike">
-                <a:solidFill>
-                  <a:schemeClr val="dk1"/>
-                </a:solidFill>
-                <a:latin typeface="Calibri"/>
-                <a:ea typeface="Calibri"/>
-                <a:cs typeface="Calibri"/>
-                <a:sym typeface="Calibri"/>
-              </a:endParaRPr>
-            </a:p>
-          </p:txBody>
-        </p:sp>
-      </p:grpSp>
-      <p:grpSp>
-        <p:nvGrpSpPr>
-          <p:cNvPr id="154" name="Google Shape;154;p15"/>
-          <p:cNvGrpSpPr/>
-          <p:nvPr/>
-        </p:nvGrpSpPr>
-        <p:grpSpPr>
-          <a:xfrm>
-            <a:off x="9844059" y="4318650"/>
-            <a:ext cx="1915770" cy="1915770"/>
-            <a:chOff x="0" y="0"/>
-            <a:chExt cx="812800" cy="812800"/>
-          </a:xfrm>
-        </p:grpSpPr>
-        <p:sp>
-          <p:nvSpPr>
-            <p:cNvPr id="155" name="Google Shape;155;p15"/>
-            <p:cNvSpPr/>
-            <p:nvPr/>
-          </p:nvSpPr>
-          <p:spPr>
-            <a:xfrm>
-              <a:off x="0" y="0"/>
-              <a:ext cx="812800" cy="812800"/>
-            </a:xfrm>
-            <a:custGeom>
-              <a:rect b="b" l="l" r="r" t="t"/>
-              <a:pathLst>
-                <a:path extrusionOk="0" h="812800" w="812800">
-                  <a:moveTo>
-                    <a:pt x="406400" y="0"/>
-                  </a:moveTo>
-                  <a:cubicBezTo>
-                    <a:pt x="181951" y="0"/>
-                    <a:pt x="0" y="181951"/>
-                    <a:pt x="0" y="406400"/>
-                  </a:cubicBezTo>
-                  <a:cubicBezTo>
-                    <a:pt x="0" y="630849"/>
-                    <a:pt x="181951" y="812800"/>
-                    <a:pt x="406400" y="812800"/>
-                  </a:cubicBezTo>
-                  <a:cubicBezTo>
-                    <a:pt x="630849" y="812800"/>
-                    <a:pt x="812800" y="630849"/>
-                    <a:pt x="812800" y="406400"/>
-                  </a:cubicBezTo>
-                  <a:cubicBezTo>
-                    <a:pt x="812800" y="181951"/>
-                    <a:pt x="630849" y="0"/>
-                    <a:pt x="406400" y="0"/>
-                  </a:cubicBezTo>
-                  <a:close/>
-                </a:path>
-              </a:pathLst>
-            </a:custGeom>
-            <a:solidFill>
-              <a:srgbClr val="7EB7E8"/>
-            </a:solidFill>
-            <a:ln>
-              <a:noFill/>
-            </a:ln>
-          </p:spPr>
-          <p:txBody>
-            <a:bodyPr anchorCtr="0" anchor="ctr" bIns="91425" lIns="91425" spcFirstLastPara="1" rIns="91425" wrap="square" tIns="91425">
-              <a:noAutofit/>
-            </a:bodyPr>
-            <a:lstStyle/>
-            <a:p>
-              <a:pPr indent="0" lvl="0" marL="0" rtl="0" algn="l">
-                <a:spcBef>
-                  <a:spcPts val="0"/>
-                </a:spcBef>
-                <a:spcAft>
-                  <a:spcPts val="0"/>
-                </a:spcAft>
-                <a:buNone/>
-              </a:pPr>
-              <a:r>
-                <a:t/>
-              </a:r>
-              <a:endParaRPr/>
-            </a:p>
-          </p:txBody>
-        </p:sp>
-        <p:sp>
-          <p:nvSpPr>
-            <p:cNvPr id="156" name="Google Shape;156;p15"/>
-            <p:cNvSpPr txBox="1"/>
-            <p:nvPr/>
-          </p:nvSpPr>
-          <p:spPr>
-            <a:xfrm>
-              <a:off x="76200" y="28575"/>
-              <a:ext cx="660400" cy="708025"/>
-            </a:xfrm>
-            <a:prstGeom prst="rect">
-              <a:avLst/>
-            </a:prstGeom>
-            <a:noFill/>
-            <a:ln>
-              <a:noFill/>
-            </a:ln>
-          </p:spPr>
-          <p:txBody>
-            <a:bodyPr anchorCtr="0" anchor="ctr" bIns="50800" lIns="50800" spcFirstLastPara="1" rIns="50800" wrap="square" tIns="50800">
-              <a:noAutofit/>
-            </a:bodyPr>
-            <a:lstStyle/>
-            <a:p>
-              <a:pPr indent="0" lvl="0" marL="0" marR="0" rtl="0" algn="ctr">
-                <a:lnSpc>
-                  <a:spcPct val="186666"/>
-                </a:lnSpc>
-                <a:spcBef>
-                  <a:spcPts val="0"/>
-                </a:spcBef>
-                <a:spcAft>
-                  <a:spcPts val="0"/>
-                </a:spcAft>
-                <a:buNone/>
-              </a:pPr>
-              <a:r>
-                <a:t/>
-              </a:r>
-              <a:endParaRPr b="0" i="0" sz="1800" u="none" cap="none" strike="noStrike">
-                <a:solidFill>
-                  <a:schemeClr val="dk1"/>
-                </a:solidFill>
-                <a:latin typeface="Calibri"/>
-                <a:ea typeface="Calibri"/>
-                <a:cs typeface="Calibri"/>
-                <a:sym typeface="Calibri"/>
-              </a:endParaRPr>
-            </a:p>
-          </p:txBody>
-        </p:sp>
-      </p:grpSp>
-      <p:grpSp>
-        <p:nvGrpSpPr>
-          <p:cNvPr id="157" name="Google Shape;157;p15"/>
-          <p:cNvGrpSpPr/>
-          <p:nvPr/>
-        </p:nvGrpSpPr>
-        <p:grpSpPr>
-          <a:xfrm>
-            <a:off x="13802486" y="4318650"/>
-            <a:ext cx="1915770" cy="1915770"/>
-            <a:chOff x="0" y="0"/>
-            <a:chExt cx="812800" cy="812800"/>
-          </a:xfrm>
-        </p:grpSpPr>
-        <p:sp>
-          <p:nvSpPr>
-            <p:cNvPr id="158" name="Google Shape;158;p15"/>
-            <p:cNvSpPr/>
-            <p:nvPr/>
-          </p:nvSpPr>
-          <p:spPr>
-            <a:xfrm>
-              <a:off x="0" y="0"/>
-              <a:ext cx="812800" cy="812800"/>
-            </a:xfrm>
-            <a:custGeom>
-              <a:rect b="b" l="l" r="r" t="t"/>
-              <a:pathLst>
-                <a:path extrusionOk="0" h="812800" w="812800">
-                  <a:moveTo>
-                    <a:pt x="406400" y="0"/>
-                  </a:moveTo>
-                  <a:cubicBezTo>
-                    <a:pt x="181951" y="0"/>
-                    <a:pt x="0" y="181951"/>
-                    <a:pt x="0" y="406400"/>
-                  </a:cubicBezTo>
-                  <a:cubicBezTo>
-                    <a:pt x="0" y="630849"/>
-                    <a:pt x="181951" y="812800"/>
-                    <a:pt x="406400" y="812800"/>
-                  </a:cubicBezTo>
-                  <a:cubicBezTo>
-                    <a:pt x="630849" y="812800"/>
-                    <a:pt x="812800" y="630849"/>
-                    <a:pt x="812800" y="406400"/>
-                  </a:cubicBezTo>
-                  <a:cubicBezTo>
-                    <a:pt x="812800" y="181951"/>
-                    <a:pt x="630849" y="0"/>
-                    <a:pt x="406400" y="0"/>
-                  </a:cubicBezTo>
-                  <a:close/>
-                </a:path>
-              </a:pathLst>
-            </a:custGeom>
-            <a:solidFill>
-              <a:srgbClr val="7EB7E8"/>
-            </a:solidFill>
-            <a:ln>
-              <a:noFill/>
-            </a:ln>
-          </p:spPr>
-          <p:txBody>
-            <a:bodyPr anchorCtr="0" anchor="ctr" bIns="91425" lIns="91425" spcFirstLastPara="1" rIns="91425" wrap="square" tIns="91425">
-              <a:noAutofit/>
-            </a:bodyPr>
-            <a:lstStyle/>
-            <a:p>
-              <a:pPr indent="0" lvl="0" marL="0" rtl="0" algn="l">
-                <a:spcBef>
-                  <a:spcPts val="0"/>
-                </a:spcBef>
-                <a:spcAft>
-                  <a:spcPts val="0"/>
-                </a:spcAft>
-                <a:buNone/>
-              </a:pPr>
-              <a:r>
-                <a:t/>
-              </a:r>
-              <a:endParaRPr/>
-            </a:p>
-          </p:txBody>
-        </p:sp>
-        <p:sp>
-          <p:nvSpPr>
-            <p:cNvPr id="159" name="Google Shape;159;p15"/>
-            <p:cNvSpPr txBox="1"/>
-            <p:nvPr/>
-          </p:nvSpPr>
-          <p:spPr>
-            <a:xfrm>
-              <a:off x="76200" y="28575"/>
-              <a:ext cx="660400" cy="708025"/>
-            </a:xfrm>
-            <a:prstGeom prst="rect">
-              <a:avLst/>
-            </a:prstGeom>
-            <a:noFill/>
-            <a:ln>
-              <a:noFill/>
-            </a:ln>
-          </p:spPr>
-          <p:txBody>
-            <a:bodyPr anchorCtr="0" anchor="ctr" bIns="50800" lIns="50800" spcFirstLastPara="1" rIns="50800" wrap="square" tIns="50800">
-              <a:noAutofit/>
-            </a:bodyPr>
-            <a:lstStyle/>
-            <a:p>
-              <a:pPr indent="0" lvl="0" marL="0" marR="0" rtl="0" algn="ctr">
-                <a:lnSpc>
-                  <a:spcPct val="186666"/>
-                </a:lnSpc>
-                <a:spcBef>
-                  <a:spcPts val="0"/>
-                </a:spcBef>
-                <a:spcAft>
-                  <a:spcPts val="0"/>
-                </a:spcAft>
-                <a:buNone/>
-              </a:pPr>
-              <a:r>
-                <a:t/>
-              </a:r>
-              <a:endParaRPr b="0" i="0" sz="1800" u="none" cap="none" strike="noStrike">
-                <a:solidFill>
-                  <a:schemeClr val="dk1"/>
-                </a:solidFill>
-                <a:latin typeface="Calibri"/>
-                <a:ea typeface="Calibri"/>
-                <a:cs typeface="Calibri"/>
-                <a:sym typeface="Calibri"/>
-              </a:endParaRPr>
-            </a:p>
-          </p:txBody>
-        </p:sp>
-      </p:grpSp>
-      <p:pic>
-        <p:nvPicPr>
-          <p:cNvPr id="160" name="Google Shape;160;p15"/>
-          <p:cNvPicPr preferRelativeResize="0"/>
-          <p:nvPr/>
-        </p:nvPicPr>
-        <p:blipFill rotWithShape="1">
-          <a:blip r:embed="rId3">
-            <a:alphaModFix/>
-          </a:blip>
-          <a:srcRect b="45298" l="12055" r="80651" t="38706"/>
-          <a:stretch/>
-        </p:blipFill>
-        <p:spPr>
-          <a:xfrm>
-            <a:off x="2280500" y="4452175"/>
-            <a:ext cx="1321400" cy="1630100"/>
-          </a:xfrm>
-          <a:prstGeom prst="rect">
-            <a:avLst/>
-          </a:prstGeom>
-          <a:noFill/>
-          <a:ln>
-            <a:noFill/>
-          </a:ln>
-        </p:spPr>
-      </p:pic>
-      <p:pic>
-        <p:nvPicPr>
-          <p:cNvPr id="161" name="Google Shape;161;p15"/>
-          <p:cNvPicPr preferRelativeResize="0"/>
-          <p:nvPr/>
-        </p:nvPicPr>
-        <p:blipFill rotWithShape="1">
-          <a:blip r:embed="rId3">
-            <a:alphaModFix/>
-          </a:blip>
-          <a:srcRect b="45298" l="34287" r="59509" t="38706"/>
-          <a:stretch/>
-        </p:blipFill>
-        <p:spPr>
-          <a:xfrm>
-            <a:off x="6281700" y="4454300"/>
-            <a:ext cx="1123676" cy="1630100"/>
-          </a:xfrm>
-          <a:prstGeom prst="rect">
-            <a:avLst/>
-          </a:prstGeom>
-          <a:noFill/>
-          <a:ln>
-            <a:noFill/>
-          </a:ln>
-        </p:spPr>
-      </p:pic>
-      <p:pic>
-        <p:nvPicPr>
-          <p:cNvPr id="162" name="Google Shape;162;p15"/>
-          <p:cNvPicPr preferRelativeResize="0"/>
-          <p:nvPr/>
-        </p:nvPicPr>
-        <p:blipFill rotWithShape="1">
-          <a:blip r:embed="rId3">
-            <a:alphaModFix/>
-          </a:blip>
-          <a:srcRect b="45298" l="56470" r="37813" t="38706"/>
-          <a:stretch/>
-        </p:blipFill>
-        <p:spPr>
-          <a:xfrm>
-            <a:off x="10300170" y="4454300"/>
-            <a:ext cx="1035612" cy="1630100"/>
-          </a:xfrm>
-          <a:prstGeom prst="rect">
-            <a:avLst/>
-          </a:prstGeom>
-          <a:noFill/>
-          <a:ln>
-            <a:noFill/>
-          </a:ln>
-        </p:spPr>
-      </p:pic>
-      <p:pic>
-        <p:nvPicPr>
-          <p:cNvPr id="163" name="Google Shape;163;p15"/>
-          <p:cNvPicPr preferRelativeResize="0"/>
-          <p:nvPr/>
-        </p:nvPicPr>
-        <p:blipFill rotWithShape="1">
-          <a:blip r:embed="rId3">
-            <a:alphaModFix/>
-          </a:blip>
-          <a:srcRect b="45298" l="77371" r="15334" t="38706"/>
-          <a:stretch/>
-        </p:blipFill>
-        <p:spPr>
-          <a:xfrm>
-            <a:off x="14162672" y="4454300"/>
-            <a:ext cx="1321400" cy="1630100"/>
-          </a:xfrm>
-          <a:prstGeom prst="rect">
-            <a:avLst/>
-          </a:prstGeom>
-          <a:noFill/>
-          <a:ln>
-            <a:noFill/>
-          </a:ln>
-        </p:spPr>
-      </p:pic>
-    </p:spTree>
-  </p:cSld>
-  <p:clrMapOvr>
-    <a:masterClrMapping/>
-  </p:clrMapOvr>
-</p:sld>
-</file>
-
-<file path=ppt/slides/slide8.xml><?xml version="1.0" encoding="utf-8"?>
-<p:sld xmlns:a="http://schemas.openxmlformats.org/drawingml/2006/main" xmlns:r="http://schemas.openxmlformats.org/officeDocument/2006/relationships" xmlns:mc="http://schemas.openxmlformats.org/markup-compatibility/2006" xmlns:mv="urn:schemas-microsoft-com:mac:vml" xmlns:p="http://schemas.openxmlformats.org/presentationml/2006/main" xmlns:c="http://schemas.openxmlformats.org/drawingml/2006/chart" xmlns:dgm="http://schemas.openxmlformats.org/drawingml/2006/diagram" xmlns:o="urn:schemas-microsoft-com:office:office" xmlns:v="urn:schemas-microsoft-com:vml" xmlns:pvml="urn:schemas-microsoft-com:office:powerpoint" xmlns:com="http://schemas.openxmlformats.org/drawingml/2006/compatibility" xmlns:p14="http://schemas.microsoft.com/office/powerpoint/2010/main" xmlns:p15="http://schemas.microsoft.com/office/powerpoint/2012/main" xmlns:ahyp="http://schemas.microsoft.com/office/drawing/2018/hyperlinkcolor">
-  <p:cSld>
-    <p:bg>
-      <p:bgPr>
-        <a:gradFill>
-          <a:gsLst>
-            <a:gs pos="0">
-              <a:srgbClr val="CDFFD8"/>
-            </a:gs>
-            <a:gs pos="100000">
-              <a:srgbClr val="94B9FF"/>
-            </a:gs>
-          </a:gsLst>
-          <a:lin ang="5400000" scaled="0"/>
-        </a:gradFill>
-      </p:bgPr>
-    </p:bg>
-    <p:spTree>
-      <p:nvGrpSpPr>
-        <p:cNvPr id="167" name="Shape 167"/>
+        <p:cNvPr id="174" name="Shape 174"/>
         <p:cNvGrpSpPr/>
         <p:nvPr/>
       </p:nvGrpSpPr>
@@ -10449,7 +11065,7 @@
       </p:grpSpPr>
       <p:grpSp>
         <p:nvGrpSpPr>
-          <p:cNvPr id="168" name="Google Shape;168;p16"/>
+          <p:cNvPr id="175" name="Google Shape;175;p17"/>
           <p:cNvGrpSpPr/>
           <p:nvPr/>
         </p:nvGrpSpPr>
@@ -10463,7 +11079,7 @@
         </p:grpSpPr>
         <p:sp>
           <p:nvSpPr>
-            <p:cNvPr id="169" name="Google Shape;169;p16"/>
+            <p:cNvPr id="176" name="Google Shape;176;p17"/>
             <p:cNvSpPr/>
             <p:nvPr/>
           </p:nvSpPr>
@@ -10510,7 +11126,7 @@
         </p:sp>
         <p:sp>
           <p:nvSpPr>
-            <p:cNvPr id="170" name="Google Shape;170;p16"/>
+            <p:cNvPr id="177" name="Google Shape;177;p17"/>
             <p:cNvSpPr/>
             <p:nvPr/>
           </p:nvSpPr>
@@ -10557,7 +11173,7 @@
         </p:sp>
         <p:sp>
           <p:nvSpPr>
-            <p:cNvPr id="171" name="Google Shape;171;p16"/>
+            <p:cNvPr id="178" name="Google Shape;178;p17"/>
             <p:cNvSpPr/>
             <p:nvPr/>
           </p:nvSpPr>
@@ -10604,7 +11220,7 @@
         </p:sp>
         <p:sp>
           <p:nvSpPr>
-            <p:cNvPr id="172" name="Google Shape;172;p16"/>
+            <p:cNvPr id="179" name="Google Shape;179;p17"/>
             <p:cNvSpPr/>
             <p:nvPr/>
           </p:nvSpPr>
@@ -10652,7 +11268,7 @@
       </p:grpSp>
       <p:sp>
         <p:nvSpPr>
-          <p:cNvPr id="173" name="Google Shape;173;p16"/>
+          <p:cNvPr id="180" name="Google Shape;180;p17"/>
           <p:cNvSpPr txBox="1"/>
           <p:nvPr/>
         </p:nvSpPr>
@@ -10712,6 +11328,285 @@
 </file>
 
 <file path=ppt/theme/theme1.xml><?xml version="1.0" encoding="utf-8"?>
+<a:theme xmlns:a="http://schemas.openxmlformats.org/drawingml/2006/main" xmlns:r="http://schemas.openxmlformats.org/officeDocument/2006/relationships">
+  <a:themeElements>
+    <a:clrScheme name="Default">
+      <a:dk1>
+        <a:srgbClr val="000000"/>
+      </a:dk1>
+      <a:lt1>
+        <a:srgbClr val="FFFFFF"/>
+      </a:lt1>
+      <a:dk2>
+        <a:srgbClr val="158158"/>
+      </a:dk2>
+      <a:lt2>
+        <a:srgbClr val="F3F3F3"/>
+      </a:lt2>
+      <a:accent1>
+        <a:srgbClr val="058DC7"/>
+      </a:accent1>
+      <a:accent2>
+        <a:srgbClr val="50B432"/>
+      </a:accent2>
+      <a:accent3>
+        <a:srgbClr val="ED561B"/>
+      </a:accent3>
+      <a:accent4>
+        <a:srgbClr val="EDEF00"/>
+      </a:accent4>
+      <a:accent5>
+        <a:srgbClr val="24CBE5"/>
+      </a:accent5>
+      <a:accent6>
+        <a:srgbClr val="64E572"/>
+      </a:accent6>
+      <a:hlink>
+        <a:srgbClr val="2200CC"/>
+      </a:hlink>
+      <a:folHlink>
+        <a:srgbClr val="551A8B"/>
+      </a:folHlink>
+    </a:clrScheme>
+    <a:fontScheme name="Office">
+      <a:majorFont>
+        <a:latin typeface="Arial"/>
+        <a:ea typeface=""/>
+        <a:cs typeface=""/>
+        <a:font script="Jpan" typeface="ＭＳ Ｐゴシック"/>
+        <a:font script="Hang" typeface="맑은 고딕"/>
+        <a:font script="Hans" typeface="宋体"/>
+        <a:font script="Hant" typeface="新細明體"/>
+        <a:font script="Arab" typeface="Times New Roman"/>
+        <a:font script="Hebr" typeface="Times New Roman"/>
+        <a:font script="Thai" typeface="Angsana New"/>
+        <a:font script="Ethi" typeface="Nyala"/>
+        <a:font script="Beng" typeface="Vrinda"/>
+        <a:font script="Gujr" typeface="Shruti"/>
+        <a:font script="Khmr" typeface="MoolBoran"/>
+        <a:font script="Knda" typeface="Tunga"/>
+        <a:font script="Guru" typeface="Raavi"/>
+        <a:font script="Cans" typeface="Euphemia"/>
+        <a:font script="Cher" typeface="Plantagenet Cherokee"/>
+        <a:font script="Yiii" typeface="Microsoft Yi Baiti"/>
+        <a:font script="Tibt" typeface="Microsoft Himalaya"/>
+        <a:font script="Thaa" typeface="MV Boli"/>
+        <a:font script="Deva" typeface="Mangal"/>
+        <a:font script="Telu" typeface="Gautami"/>
+        <a:font script="Taml" typeface="Latha"/>
+        <a:font script="Syrc" typeface="Estrangelo Edessa"/>
+        <a:font script="Orya" typeface="Kalinga"/>
+        <a:font script="Mlym" typeface="Kartika"/>
+        <a:font script="Laoo" typeface="DokChampa"/>
+        <a:font script="Sinh" typeface="Iskoola Pota"/>
+        <a:font script="Mong" typeface="Mongolian Baiti"/>
+        <a:font script="Viet" typeface="Times New Roman"/>
+        <a:font script="Uigh" typeface="Microsoft Uighur"/>
+        <a:font script="Geor" typeface="Sylfaen"/>
+      </a:majorFont>
+      <a:minorFont>
+        <a:latin typeface="Arial"/>
+        <a:ea typeface=""/>
+        <a:cs typeface=""/>
+        <a:font script="Jpan" typeface="ＭＳ Ｐゴシック"/>
+        <a:font script="Hang" typeface="맑은 고딕"/>
+        <a:font script="Hans" typeface="宋体"/>
+        <a:font script="Hant" typeface="新細明體"/>
+        <a:font script="Arab" typeface="Arial"/>
+        <a:font script="Hebr" typeface="Arial"/>
+        <a:font script="Thai" typeface="Cordia New"/>
+        <a:font script="Ethi" typeface="Nyala"/>
+        <a:font script="Beng" typeface="Vrinda"/>
+        <a:font script="Gujr" typeface="Shruti"/>
+        <a:font script="Khmr" typeface="DaunPenh"/>
+        <a:font script="Knda" typeface="Tunga"/>
+        <a:font script="Guru" typeface="Raavi"/>
+        <a:font script="Cans" typeface="Euphemia"/>
+        <a:font script="Cher" typeface="Plantagenet Cherokee"/>
+        <a:font script="Yiii" typeface="Microsoft Yi Baiti"/>
+        <a:font script="Tibt" typeface="Microsoft Himalaya"/>
+        <a:font script="Thaa" typeface="MV Boli"/>
+        <a:font script="Deva" typeface="Mangal"/>
+        <a:font script="Telu" typeface="Gautami"/>
+        <a:font script="Taml" typeface="Latha"/>
+        <a:font script="Syrc" typeface="Estrangelo Edessa"/>
+        <a:font script="Orya" typeface="Kalinga"/>
+        <a:font script="Mlym" typeface="Kartika"/>
+        <a:font script="Laoo" typeface="DokChampa"/>
+        <a:font script="Sinh" typeface="Iskoola Pota"/>
+        <a:font script="Mong" typeface="Mongolian Baiti"/>
+        <a:font script="Viet" typeface="Arial"/>
+        <a:font script="Uigh" typeface="Microsoft Uighur"/>
+        <a:font script="Geor" typeface="Sylfaen"/>
+      </a:minorFont>
+    </a:fontScheme>
+    <a:fmtScheme name="Office">
+      <a:fillStyleLst>
+        <a:solidFill>
+          <a:schemeClr val="phClr"/>
+        </a:solidFill>
+        <a:gradFill rotWithShape="1">
+          <a:gsLst>
+            <a:gs pos="0">
+              <a:schemeClr val="phClr">
+                <a:tint val="50000"/>
+                <a:satMod val="300000"/>
+              </a:schemeClr>
+            </a:gs>
+            <a:gs pos="35000">
+              <a:schemeClr val="phClr">
+                <a:tint val="37000"/>
+                <a:satMod val="300000"/>
+              </a:schemeClr>
+            </a:gs>
+            <a:gs pos="100000">
+              <a:schemeClr val="phClr">
+                <a:tint val="15000"/>
+                <a:satMod val="350000"/>
+              </a:schemeClr>
+            </a:gs>
+          </a:gsLst>
+          <a:lin ang="16200000" scaled="1"/>
+        </a:gradFill>
+        <a:gradFill rotWithShape="1">
+          <a:gsLst>
+            <a:gs pos="0">
+              <a:schemeClr val="phClr">
+                <a:tint val="100000"/>
+                <a:shade val="100000"/>
+                <a:satMod val="130000"/>
+              </a:schemeClr>
+            </a:gs>
+            <a:gs pos="100000">
+              <a:schemeClr val="phClr">
+                <a:tint val="50000"/>
+                <a:shade val="100000"/>
+                <a:satMod val="350000"/>
+              </a:schemeClr>
+            </a:gs>
+          </a:gsLst>
+          <a:lin ang="16200000" scaled="0"/>
+        </a:gradFill>
+      </a:fillStyleLst>
+      <a:lnStyleLst>
+        <a:ln w="9525" cap="flat" cmpd="sng" algn="ctr">
+          <a:solidFill>
+            <a:schemeClr val="phClr">
+              <a:shade val="95000"/>
+              <a:satMod val="105000"/>
+            </a:schemeClr>
+          </a:solidFill>
+          <a:prstDash val="solid"/>
+        </a:ln>
+        <a:ln w="25400" cap="flat" cmpd="sng" algn="ctr">
+          <a:solidFill>
+            <a:schemeClr val="phClr"/>
+          </a:solidFill>
+          <a:prstDash val="solid"/>
+        </a:ln>
+        <a:ln w="38100" cap="flat" cmpd="sng" algn="ctr">
+          <a:solidFill>
+            <a:schemeClr val="phClr"/>
+          </a:solidFill>
+          <a:prstDash val="solid"/>
+        </a:ln>
+      </a:lnStyleLst>
+      <a:effectStyleLst>
+        <a:effectStyle>
+          <a:effectLst>
+            <a:outerShdw blurRad="40000" dist="20000" dir="5400000" rotWithShape="0">
+              <a:srgbClr val="000000">
+                <a:alpha val="38000"/>
+              </a:srgbClr>
+            </a:outerShdw>
+          </a:effectLst>
+        </a:effectStyle>
+        <a:effectStyle>
+          <a:effectLst>
+            <a:outerShdw blurRad="40000" dist="23000" dir="5400000" rotWithShape="0">
+              <a:srgbClr val="000000">
+                <a:alpha val="35000"/>
+              </a:srgbClr>
+            </a:outerShdw>
+          </a:effectLst>
+        </a:effectStyle>
+        <a:effectStyle>
+          <a:effectLst>
+            <a:outerShdw blurRad="40000" dist="23000" dir="5400000" rotWithShape="0">
+              <a:srgbClr val="000000">
+                <a:alpha val="35000"/>
+              </a:srgbClr>
+            </a:outerShdw>
+          </a:effectLst>
+          <a:scene3d>
+            <a:camera prst="orthographicFront">
+              <a:rot lat="0" lon="0" rev="0"/>
+            </a:camera>
+            <a:lightRig rig="threePt" dir="t">
+              <a:rot lat="0" lon="0" rev="1200000"/>
+            </a:lightRig>
+          </a:scene3d>
+          <a:sp3d>
+            <a:bevelT w="63500" h="25400"/>
+          </a:sp3d>
+        </a:effectStyle>
+      </a:effectStyleLst>
+      <a:bgFillStyleLst>
+        <a:solidFill>
+          <a:schemeClr val="phClr"/>
+        </a:solidFill>
+        <a:gradFill rotWithShape="1">
+          <a:gsLst>
+            <a:gs pos="0">
+              <a:schemeClr val="phClr">
+                <a:tint val="40000"/>
+                <a:satMod val="350000"/>
+              </a:schemeClr>
+            </a:gs>
+            <a:gs pos="40000">
+              <a:schemeClr val="phClr">
+                <a:tint val="45000"/>
+                <a:shade val="99000"/>
+                <a:satMod val="350000"/>
+              </a:schemeClr>
+            </a:gs>
+            <a:gs pos="100000">
+              <a:schemeClr val="phClr">
+                <a:shade val="20000"/>
+                <a:satMod val="255000"/>
+              </a:schemeClr>
+            </a:gs>
+          </a:gsLst>
+          <a:path path="circle">
+            <a:fillToRect l="50000" t="-80000" r="50000" b="180000"/>
+          </a:path>
+        </a:gradFill>
+        <a:gradFill rotWithShape="1">
+          <a:gsLst>
+            <a:gs pos="0">
+              <a:schemeClr val="phClr">
+                <a:tint val="80000"/>
+                <a:satMod val="300000"/>
+              </a:schemeClr>
+            </a:gs>
+            <a:gs pos="100000">
+              <a:schemeClr val="phClr">
+                <a:shade val="30000"/>
+                <a:satMod val="200000"/>
+              </a:schemeClr>
+            </a:gs>
+          </a:gsLst>
+          <a:path path="circle">
+            <a:fillToRect l="50000" t="50000" r="50000" b="50000"/>
+          </a:path>
+        </a:gradFill>
+      </a:bgFillStyleLst>
+    </a:fmtScheme>
+  </a:themeElements>
+</a:theme>
+</file>
+
+<file path=ppt/theme/theme2.xml><?xml version="1.0" encoding="utf-8"?>
 <a:theme xmlns:a="http://schemas.openxmlformats.org/drawingml/2006/main" xmlns:r="http://schemas.openxmlformats.org/officeDocument/2006/relationships" name="AI Agency Pitch Deck">
   <a:themeElements>
     <a:clrScheme name="Office">
@@ -10988,283 +11883,4 @@
     </a:fmtScheme>
   </a:themeElements>
 </a:theme>
-</file>
-
-<file path=ppt/theme/theme2.xml><?xml version="1.0" encoding="utf-8"?>
-<a:theme xmlns:a="http://schemas.openxmlformats.org/drawingml/2006/main" xmlns:r="http://schemas.openxmlformats.org/officeDocument/2006/relationships">
-  <a:themeElements>
-    <a:clrScheme name="Default">
-      <a:dk1>
-        <a:srgbClr val="000000"/>
-      </a:dk1>
-      <a:lt1>
-        <a:srgbClr val="FFFFFF"/>
-      </a:lt1>
-      <a:dk2>
-        <a:srgbClr val="158158"/>
-      </a:dk2>
-      <a:lt2>
-        <a:srgbClr val="F3F3F3"/>
-      </a:lt2>
-      <a:accent1>
-        <a:srgbClr val="058DC7"/>
-      </a:accent1>
-      <a:accent2>
-        <a:srgbClr val="50B432"/>
-      </a:accent2>
-      <a:accent3>
-        <a:srgbClr val="ED561B"/>
-      </a:accent3>
-      <a:accent4>
-        <a:srgbClr val="EDEF00"/>
-      </a:accent4>
-      <a:accent5>
-        <a:srgbClr val="24CBE5"/>
-      </a:accent5>
-      <a:accent6>
-        <a:srgbClr val="64E572"/>
-      </a:accent6>
-      <a:hlink>
-        <a:srgbClr val="2200CC"/>
-      </a:hlink>
-      <a:folHlink>
-        <a:srgbClr val="551A8B"/>
-      </a:folHlink>
-    </a:clrScheme>
-    <a:fontScheme name="Office">
-      <a:majorFont>
-        <a:latin typeface="Arial"/>
-        <a:ea typeface=""/>
-        <a:cs typeface=""/>
-        <a:font script="Jpan" typeface="ＭＳ Ｐゴシック"/>
-        <a:font script="Hang" typeface="맑은 고딕"/>
-        <a:font script="Hans" typeface="宋体"/>
-        <a:font script="Hant" typeface="新細明體"/>
-        <a:font script="Arab" typeface="Times New Roman"/>
-        <a:font script="Hebr" typeface="Times New Roman"/>
-        <a:font script="Thai" typeface="Angsana New"/>
-        <a:font script="Ethi" typeface="Nyala"/>
-        <a:font script="Beng" typeface="Vrinda"/>
-        <a:font script="Gujr" typeface="Shruti"/>
-        <a:font script="Khmr" typeface="MoolBoran"/>
-        <a:font script="Knda" typeface="Tunga"/>
-        <a:font script="Guru" typeface="Raavi"/>
-        <a:font script="Cans" typeface="Euphemia"/>
-        <a:font script="Cher" typeface="Plantagenet Cherokee"/>
-        <a:font script="Yiii" typeface="Microsoft Yi Baiti"/>
-        <a:font script="Tibt" typeface="Microsoft Himalaya"/>
-        <a:font script="Thaa" typeface="MV Boli"/>
-        <a:font script="Deva" typeface="Mangal"/>
-        <a:font script="Telu" typeface="Gautami"/>
-        <a:font script="Taml" typeface="Latha"/>
-        <a:font script="Syrc" typeface="Estrangelo Edessa"/>
-        <a:font script="Orya" typeface="Kalinga"/>
-        <a:font script="Mlym" typeface="Kartika"/>
-        <a:font script="Laoo" typeface="DokChampa"/>
-        <a:font script="Sinh" typeface="Iskoola Pota"/>
-        <a:font script="Mong" typeface="Mongolian Baiti"/>
-        <a:font script="Viet" typeface="Times New Roman"/>
-        <a:font script="Uigh" typeface="Microsoft Uighur"/>
-        <a:font script="Geor" typeface="Sylfaen"/>
-      </a:majorFont>
-      <a:minorFont>
-        <a:latin typeface="Arial"/>
-        <a:ea typeface=""/>
-        <a:cs typeface=""/>
-        <a:font script="Jpan" typeface="ＭＳ Ｐゴシック"/>
-        <a:font script="Hang" typeface="맑은 고딕"/>
-        <a:font script="Hans" typeface="宋体"/>
-        <a:font script="Hant" typeface="新細明體"/>
-        <a:font script="Arab" typeface="Arial"/>
-        <a:font script="Hebr" typeface="Arial"/>
-        <a:font script="Thai" typeface="Cordia New"/>
-        <a:font script="Ethi" typeface="Nyala"/>
-        <a:font script="Beng" typeface="Vrinda"/>
-        <a:font script="Gujr" typeface="Shruti"/>
-        <a:font script="Khmr" typeface="DaunPenh"/>
-        <a:font script="Knda" typeface="Tunga"/>
-        <a:font script="Guru" typeface="Raavi"/>
-        <a:font script="Cans" typeface="Euphemia"/>
-        <a:font script="Cher" typeface="Plantagenet Cherokee"/>
-        <a:font script="Yiii" typeface="Microsoft Yi Baiti"/>
-        <a:font script="Tibt" typeface="Microsoft Himalaya"/>
-        <a:font script="Thaa" typeface="MV Boli"/>
-        <a:font script="Deva" typeface="Mangal"/>
-        <a:font script="Telu" typeface="Gautami"/>
-        <a:font script="Taml" typeface="Latha"/>
-        <a:font script="Syrc" typeface="Estrangelo Edessa"/>
-        <a:font script="Orya" typeface="Kalinga"/>
-        <a:font script="Mlym" typeface="Kartika"/>
-        <a:font script="Laoo" typeface="DokChampa"/>
-        <a:font script="Sinh" typeface="Iskoola Pota"/>
-        <a:font script="Mong" typeface="Mongolian Baiti"/>
-        <a:font script="Viet" typeface="Arial"/>
-        <a:font script="Uigh" typeface="Microsoft Uighur"/>
-        <a:font script="Geor" typeface="Sylfaen"/>
-      </a:minorFont>
-    </a:fontScheme>
-    <a:fmtScheme name="Office">
-      <a:fillStyleLst>
-        <a:solidFill>
-          <a:schemeClr val="phClr"/>
-        </a:solidFill>
-        <a:gradFill rotWithShape="1">
-          <a:gsLst>
-            <a:gs pos="0">
-              <a:schemeClr val="phClr">
-                <a:tint val="50000"/>
-                <a:satMod val="300000"/>
-              </a:schemeClr>
-            </a:gs>
-            <a:gs pos="35000">
-              <a:schemeClr val="phClr">
-                <a:tint val="37000"/>
-                <a:satMod val="300000"/>
-              </a:schemeClr>
-            </a:gs>
-            <a:gs pos="100000">
-              <a:schemeClr val="phClr">
-                <a:tint val="15000"/>
-                <a:satMod val="350000"/>
-              </a:schemeClr>
-            </a:gs>
-          </a:gsLst>
-          <a:lin ang="16200000" scaled="1"/>
-        </a:gradFill>
-        <a:gradFill rotWithShape="1">
-          <a:gsLst>
-            <a:gs pos="0">
-              <a:schemeClr val="phClr">
-                <a:tint val="100000"/>
-                <a:shade val="100000"/>
-                <a:satMod val="130000"/>
-              </a:schemeClr>
-            </a:gs>
-            <a:gs pos="100000">
-              <a:schemeClr val="phClr">
-                <a:tint val="50000"/>
-                <a:shade val="100000"/>
-                <a:satMod val="350000"/>
-              </a:schemeClr>
-            </a:gs>
-          </a:gsLst>
-          <a:lin ang="16200000" scaled="0"/>
-        </a:gradFill>
-      </a:fillStyleLst>
-      <a:lnStyleLst>
-        <a:ln w="9525" cap="flat" cmpd="sng" algn="ctr">
-          <a:solidFill>
-            <a:schemeClr val="phClr">
-              <a:shade val="95000"/>
-              <a:satMod val="105000"/>
-            </a:schemeClr>
-          </a:solidFill>
-          <a:prstDash val="solid"/>
-        </a:ln>
-        <a:ln w="25400" cap="flat" cmpd="sng" algn="ctr">
-          <a:solidFill>
-            <a:schemeClr val="phClr"/>
-          </a:solidFill>
-          <a:prstDash val="solid"/>
-        </a:ln>
-        <a:ln w="38100" cap="flat" cmpd="sng" algn="ctr">
-          <a:solidFill>
-            <a:schemeClr val="phClr"/>
-          </a:solidFill>
-          <a:prstDash val="solid"/>
-        </a:ln>
-      </a:lnStyleLst>
-      <a:effectStyleLst>
-        <a:effectStyle>
-          <a:effectLst>
-            <a:outerShdw blurRad="40000" dist="20000" dir="5400000" rotWithShape="0">
-              <a:srgbClr val="000000">
-                <a:alpha val="38000"/>
-              </a:srgbClr>
-            </a:outerShdw>
-          </a:effectLst>
-        </a:effectStyle>
-        <a:effectStyle>
-          <a:effectLst>
-            <a:outerShdw blurRad="40000" dist="23000" dir="5400000" rotWithShape="0">
-              <a:srgbClr val="000000">
-                <a:alpha val="35000"/>
-              </a:srgbClr>
-            </a:outerShdw>
-          </a:effectLst>
-        </a:effectStyle>
-        <a:effectStyle>
-          <a:effectLst>
-            <a:outerShdw blurRad="40000" dist="23000" dir="5400000" rotWithShape="0">
-              <a:srgbClr val="000000">
-                <a:alpha val="35000"/>
-              </a:srgbClr>
-            </a:outerShdw>
-          </a:effectLst>
-          <a:scene3d>
-            <a:camera prst="orthographicFront">
-              <a:rot lat="0" lon="0" rev="0"/>
-            </a:camera>
-            <a:lightRig rig="threePt" dir="t">
-              <a:rot lat="0" lon="0" rev="1200000"/>
-            </a:lightRig>
-          </a:scene3d>
-          <a:sp3d>
-            <a:bevelT w="63500" h="25400"/>
-          </a:sp3d>
-        </a:effectStyle>
-      </a:effectStyleLst>
-      <a:bgFillStyleLst>
-        <a:solidFill>
-          <a:schemeClr val="phClr"/>
-        </a:solidFill>
-        <a:gradFill rotWithShape="1">
-          <a:gsLst>
-            <a:gs pos="0">
-              <a:schemeClr val="phClr">
-                <a:tint val="40000"/>
-                <a:satMod val="350000"/>
-              </a:schemeClr>
-            </a:gs>
-            <a:gs pos="40000">
-              <a:schemeClr val="phClr">
-                <a:tint val="45000"/>
-                <a:shade val="99000"/>
-                <a:satMod val="350000"/>
-              </a:schemeClr>
-            </a:gs>
-            <a:gs pos="100000">
-              <a:schemeClr val="phClr">
-                <a:shade val="20000"/>
-                <a:satMod val="255000"/>
-              </a:schemeClr>
-            </a:gs>
-          </a:gsLst>
-          <a:path path="circle">
-            <a:fillToRect l="50000" t="-80000" r="50000" b="180000"/>
-          </a:path>
-        </a:gradFill>
-        <a:gradFill rotWithShape="1">
-          <a:gsLst>
-            <a:gs pos="0">
-              <a:schemeClr val="phClr">
-                <a:tint val="80000"/>
-                <a:satMod val="300000"/>
-              </a:schemeClr>
-            </a:gs>
-            <a:gs pos="100000">
-              <a:schemeClr val="phClr">
-                <a:shade val="30000"/>
-                <a:satMod val="200000"/>
-              </a:schemeClr>
-            </a:gs>
-          </a:gsLst>
-          <a:path path="circle">
-            <a:fillToRect l="50000" t="50000" r="50000" b="50000"/>
-          </a:path>
-        </a:gradFill>
-      </a:bgFillStyleLst>
-    </a:fmtScheme>
-  </a:themeElements>
-</a:theme>
 </file>
</xml_diff>